<commit_message>
Added Pyrus PVT Tool Features
Added post describing features of the PVT tool, instructions on how to use and video tour of the feature.
</commit_message>
<xml_diff>
--- a/images/Pyrus/pvt-fluid-properties-tool/pvt-fluid-properties-tool-figures.pptx
+++ b/images/Pyrus/pvt-fluid-properties-tool/pvt-fluid-properties-tool-figures.pptx
@@ -6,6 +6,8 @@
   </p:sldMasterIdLst>
   <p:sldIdLst>
     <p:sldId id="256" r:id="rId2"/>
+    <p:sldId id="257" r:id="rId3"/>
+    <p:sldId id="258" r:id="rId4"/>
   </p:sldIdLst>
   <p:sldSz cx="12192000" cy="6858000"/>
   <p:notesSz cx="6858000" cy="9144000"/>
@@ -123,6 +125,138 @@
 </p:presentation>
 </file>
 
+<file path=ppt/revisionInfo.xml><?xml version="1.0" encoding="utf-8"?>
+<p1510:revInfo xmlns:a="http://schemas.openxmlformats.org/drawingml/2006/main" xmlns:r="http://schemas.openxmlformats.org/officeDocument/2006/relationships" xmlns:p1510="http://schemas.microsoft.com/office/powerpoint/2015/10/main">
+  <p1510:revLst>
+    <p1510:client id="{194CD0C4-092C-4FCC-883E-593781E5FCB0}" v="11" dt="2024-06-21T06:15:56.871"/>
+  </p1510:revLst>
+</p1510:revInfo>
+</file>
+
+<file path=ppt/changesInfos/changesInfo1.xml><?xml version="1.0" encoding="utf-8"?>
+<pc:chgInfo xmlns:a="http://schemas.openxmlformats.org/drawingml/2006/main" xmlns:r="http://schemas.openxmlformats.org/officeDocument/2006/relationships" xmlns:ac="http://schemas.microsoft.com/office/drawing/2013/main/command" xmlns:pc="http://schemas.microsoft.com/office/powerpoint/2013/main/command">
+  <pc:docChgLst>
+    <pc:chgData name="Sharmaine Kirkham" userId="77a42548e3ef5a1f" providerId="LiveId" clId="{194CD0C4-092C-4FCC-883E-593781E5FCB0}"/>
+    <pc:docChg chg="undo custSel addSld modSld">
+      <pc:chgData name="Sharmaine Kirkham" userId="77a42548e3ef5a1f" providerId="LiveId" clId="{194CD0C4-092C-4FCC-883E-593781E5FCB0}" dt="2024-06-21T06:16:30.841" v="243" actId="207"/>
+      <pc:docMkLst>
+        <pc:docMk/>
+      </pc:docMkLst>
+      <pc:sldChg chg="addSp delSp modSp new mod">
+        <pc:chgData name="Sharmaine Kirkham" userId="77a42548e3ef5a1f" providerId="LiveId" clId="{194CD0C4-092C-4FCC-883E-593781E5FCB0}" dt="2024-06-21T06:16:30.841" v="243" actId="207"/>
+        <pc:sldMkLst>
+          <pc:docMk/>
+          <pc:sldMk cId="997275920" sldId="257"/>
+        </pc:sldMkLst>
+        <pc:spChg chg="add mod">
+          <ac:chgData name="Sharmaine Kirkham" userId="77a42548e3ef5a1f" providerId="LiveId" clId="{194CD0C4-092C-4FCC-883E-593781E5FCB0}" dt="2024-06-21T06:01:21.373" v="208"/>
+          <ac:spMkLst>
+            <pc:docMk/>
+            <pc:sldMk cId="997275920" sldId="257"/>
+            <ac:spMk id="9" creationId="{C04B72FF-7C27-4960-6C49-A1D5718AD5B5}"/>
+          </ac:spMkLst>
+        </pc:spChg>
+        <pc:spChg chg="add mod">
+          <ac:chgData name="Sharmaine Kirkham" userId="77a42548e3ef5a1f" providerId="LiveId" clId="{194CD0C4-092C-4FCC-883E-593781E5FCB0}" dt="2024-06-21T06:16:30.841" v="243" actId="207"/>
+          <ac:spMkLst>
+            <pc:docMk/>
+            <pc:sldMk cId="997275920" sldId="257"/>
+            <ac:spMk id="10" creationId="{236F9E0E-C9D3-2A03-7FE8-7B6107A38C9D}"/>
+          </ac:spMkLst>
+        </pc:spChg>
+        <pc:grpChg chg="add mod">
+          <ac:chgData name="Sharmaine Kirkham" userId="77a42548e3ef5a1f" providerId="LiveId" clId="{194CD0C4-092C-4FCC-883E-593781E5FCB0}" dt="2024-06-21T05:59:36.214" v="151" actId="14100"/>
+          <ac:grpSpMkLst>
+            <pc:docMk/>
+            <pc:sldMk cId="997275920" sldId="257"/>
+            <ac:grpSpMk id="6" creationId="{2582EA95-D663-7AC8-584D-9D64D80C5D1E}"/>
+          </ac:grpSpMkLst>
+        </pc:grpChg>
+        <pc:picChg chg="add del">
+          <ac:chgData name="Sharmaine Kirkham" userId="77a42548e3ef5a1f" providerId="LiveId" clId="{194CD0C4-092C-4FCC-883E-593781E5FCB0}" dt="2024-06-21T05:57:04.840" v="138" actId="478"/>
+          <ac:picMkLst>
+            <pc:docMk/>
+            <pc:sldMk cId="997275920" sldId="257"/>
+            <ac:picMk id="3" creationId="{7D095E6B-EE03-18DE-42F2-6769C314FA0D}"/>
+          </ac:picMkLst>
+        </pc:picChg>
+        <pc:picChg chg="add mod">
+          <ac:chgData name="Sharmaine Kirkham" userId="77a42548e3ef5a1f" providerId="LiveId" clId="{194CD0C4-092C-4FCC-883E-593781E5FCB0}" dt="2024-06-21T05:59:20.347" v="150" actId="164"/>
+          <ac:picMkLst>
+            <pc:docMk/>
+            <pc:sldMk cId="997275920" sldId="257"/>
+            <ac:picMk id="5" creationId="{93C1270F-60F2-D8D5-91BB-7885A6DE3F41}"/>
+          </ac:picMkLst>
+        </pc:picChg>
+        <pc:picChg chg="add mod">
+          <ac:chgData name="Sharmaine Kirkham" userId="77a42548e3ef5a1f" providerId="LiveId" clId="{194CD0C4-092C-4FCC-883E-593781E5FCB0}" dt="2024-06-21T05:56:34.239" v="132"/>
+          <ac:picMkLst>
+            <pc:docMk/>
+            <pc:sldMk cId="997275920" sldId="257"/>
+            <ac:picMk id="7" creationId="{FA0F60EF-D812-0213-9E1C-67024F2391CF}"/>
+          </ac:picMkLst>
+        </pc:picChg>
+        <pc:picChg chg="add mod modCrop">
+          <ac:chgData name="Sharmaine Kirkham" userId="77a42548e3ef5a1f" providerId="LiveId" clId="{194CD0C4-092C-4FCC-883E-593781E5FCB0}" dt="2024-06-21T05:59:20.347" v="150" actId="164"/>
+          <ac:picMkLst>
+            <pc:docMk/>
+            <pc:sldMk cId="997275920" sldId="257"/>
+            <ac:picMk id="8" creationId="{1052F1E1-161E-A6F1-996A-1672DF1452BC}"/>
+          </ac:picMkLst>
+        </pc:picChg>
+      </pc:sldChg>
+      <pc:sldChg chg="addSp delSp modSp new mod">
+        <pc:chgData name="Sharmaine Kirkham" userId="77a42548e3ef5a1f" providerId="LiveId" clId="{194CD0C4-092C-4FCC-883E-593781E5FCB0}" dt="2024-06-21T05:58:23.881" v="143" actId="21"/>
+        <pc:sldMkLst>
+          <pc:docMk/>
+          <pc:sldMk cId="2807728461" sldId="258"/>
+        </pc:sldMkLst>
+        <pc:picChg chg="add del">
+          <ac:chgData name="Sharmaine Kirkham" userId="77a42548e3ef5a1f" providerId="LiveId" clId="{194CD0C4-092C-4FCC-883E-593781E5FCB0}" dt="2024-06-21T05:55:11.644" v="4" actId="478"/>
+          <ac:picMkLst>
+            <pc:docMk/>
+            <pc:sldMk cId="2807728461" sldId="258"/>
+            <ac:picMk id="3" creationId="{BABDBB60-61AE-2A46-8AE7-243B1F0A8383}"/>
+          </ac:picMkLst>
+        </pc:picChg>
+        <pc:picChg chg="add del">
+          <ac:chgData name="Sharmaine Kirkham" userId="77a42548e3ef5a1f" providerId="LiveId" clId="{194CD0C4-092C-4FCC-883E-593781E5FCB0}" dt="2024-06-21T05:56:06.541" v="6" actId="478"/>
+          <ac:picMkLst>
+            <pc:docMk/>
+            <pc:sldMk cId="2807728461" sldId="258"/>
+            <ac:picMk id="5" creationId="{62D024FC-40BC-8092-5AAC-3C88668E8BE4}"/>
+          </ac:picMkLst>
+        </pc:picChg>
+        <pc:picChg chg="add del mod">
+          <ac:chgData name="Sharmaine Kirkham" userId="77a42548e3ef5a1f" providerId="LiveId" clId="{194CD0C4-092C-4FCC-883E-593781E5FCB0}" dt="2024-06-21T05:56:32.874" v="131" actId="21"/>
+          <ac:picMkLst>
+            <pc:docMk/>
+            <pc:sldMk cId="2807728461" sldId="258"/>
+            <ac:picMk id="7" creationId="{FA0F60EF-D812-0213-9E1C-67024F2391CF}"/>
+          </ac:picMkLst>
+        </pc:picChg>
+        <pc:picChg chg="add del mod">
+          <ac:chgData name="Sharmaine Kirkham" userId="77a42548e3ef5a1f" providerId="LiveId" clId="{194CD0C4-092C-4FCC-883E-593781E5FCB0}" dt="2024-06-21T05:58:23.881" v="143" actId="21"/>
+          <ac:picMkLst>
+            <pc:docMk/>
+            <pc:sldMk cId="2807728461" sldId="258"/>
+            <ac:picMk id="8" creationId="{1052F1E1-161E-A6F1-996A-1672DF1452BC}"/>
+          </ac:picMkLst>
+        </pc:picChg>
+        <pc:picChg chg="add del">
+          <ac:chgData name="Sharmaine Kirkham" userId="77a42548e3ef5a1f" providerId="LiveId" clId="{194CD0C4-092C-4FCC-883E-593781E5FCB0}" dt="2024-06-21T05:57:01.306" v="136" actId="22"/>
+          <ac:picMkLst>
+            <pc:docMk/>
+            <pc:sldMk cId="2807728461" sldId="258"/>
+            <ac:picMk id="10" creationId="{B72569EE-C359-66A3-083C-4C28189004CB}"/>
+          </ac:picMkLst>
+        </pc:picChg>
+      </pc:sldChg>
+    </pc:docChg>
+  </pc:docChgLst>
+</pc:chgInfo>
+</file>
+
 <file path=ppt/slideLayouts/slideLayout1.xml><?xml version="1.0" encoding="utf-8"?>
 <p:sldLayout xmlns:a="http://schemas.openxmlformats.org/drawingml/2006/main" xmlns:r="http://schemas.openxmlformats.org/officeDocument/2006/relationships" xmlns:p="http://schemas.openxmlformats.org/presentationml/2006/main" type="title" preserve="1">
   <p:cSld name="Title Slide">
@@ -272,7 +406,7 @@
           <a:p>
             <a:fld id="{6A437CCC-AC60-44D6-AE7F-98F74AF7C374}" type="datetimeFigureOut">
               <a:rPr lang="en-AU" smtClean="0"/>
-              <a:t>18/06/2024</a:t>
+              <a:t>21/06/2024</a:t>
             </a:fld>
             <a:endParaRPr lang="en-AU"/>
           </a:p>
@@ -472,7 +606,7 @@
           <a:p>
             <a:fld id="{6A437CCC-AC60-44D6-AE7F-98F74AF7C374}" type="datetimeFigureOut">
               <a:rPr lang="en-AU" smtClean="0"/>
-              <a:t>18/06/2024</a:t>
+              <a:t>21/06/2024</a:t>
             </a:fld>
             <a:endParaRPr lang="en-AU"/>
           </a:p>
@@ -682,7 +816,7 @@
           <a:p>
             <a:fld id="{6A437CCC-AC60-44D6-AE7F-98F74AF7C374}" type="datetimeFigureOut">
               <a:rPr lang="en-AU" smtClean="0"/>
-              <a:t>18/06/2024</a:t>
+              <a:t>21/06/2024</a:t>
             </a:fld>
             <a:endParaRPr lang="en-AU"/>
           </a:p>
@@ -882,7 +1016,7 @@
           <a:p>
             <a:fld id="{6A437CCC-AC60-44D6-AE7F-98F74AF7C374}" type="datetimeFigureOut">
               <a:rPr lang="en-AU" smtClean="0"/>
-              <a:t>18/06/2024</a:t>
+              <a:t>21/06/2024</a:t>
             </a:fld>
             <a:endParaRPr lang="en-AU"/>
           </a:p>
@@ -1158,7 +1292,7 @@
           <a:p>
             <a:fld id="{6A437CCC-AC60-44D6-AE7F-98F74AF7C374}" type="datetimeFigureOut">
               <a:rPr lang="en-AU" smtClean="0"/>
-              <a:t>18/06/2024</a:t>
+              <a:t>21/06/2024</a:t>
             </a:fld>
             <a:endParaRPr lang="en-AU"/>
           </a:p>
@@ -1426,7 +1560,7 @@
           <a:p>
             <a:fld id="{6A437CCC-AC60-44D6-AE7F-98F74AF7C374}" type="datetimeFigureOut">
               <a:rPr lang="en-AU" smtClean="0"/>
-              <a:t>18/06/2024</a:t>
+              <a:t>21/06/2024</a:t>
             </a:fld>
             <a:endParaRPr lang="en-AU"/>
           </a:p>
@@ -1841,7 +1975,7 @@
           <a:p>
             <a:fld id="{6A437CCC-AC60-44D6-AE7F-98F74AF7C374}" type="datetimeFigureOut">
               <a:rPr lang="en-AU" smtClean="0"/>
-              <a:t>18/06/2024</a:t>
+              <a:t>21/06/2024</a:t>
             </a:fld>
             <a:endParaRPr lang="en-AU"/>
           </a:p>
@@ -1983,7 +2117,7 @@
           <a:p>
             <a:fld id="{6A437CCC-AC60-44D6-AE7F-98F74AF7C374}" type="datetimeFigureOut">
               <a:rPr lang="en-AU" smtClean="0"/>
-              <a:t>18/06/2024</a:t>
+              <a:t>21/06/2024</a:t>
             </a:fld>
             <a:endParaRPr lang="en-AU"/>
           </a:p>
@@ -2096,7 +2230,7 @@
           <a:p>
             <a:fld id="{6A437CCC-AC60-44D6-AE7F-98F74AF7C374}" type="datetimeFigureOut">
               <a:rPr lang="en-AU" smtClean="0"/>
-              <a:t>18/06/2024</a:t>
+              <a:t>21/06/2024</a:t>
             </a:fld>
             <a:endParaRPr lang="en-AU"/>
           </a:p>
@@ -2409,7 +2543,7 @@
           <a:p>
             <a:fld id="{6A437CCC-AC60-44D6-AE7F-98F74AF7C374}" type="datetimeFigureOut">
               <a:rPr lang="en-AU" smtClean="0"/>
-              <a:t>18/06/2024</a:t>
+              <a:t>21/06/2024</a:t>
             </a:fld>
             <a:endParaRPr lang="en-AU"/>
           </a:p>
@@ -2698,7 +2832,7 @@
           <a:p>
             <a:fld id="{6A437CCC-AC60-44D6-AE7F-98F74AF7C374}" type="datetimeFigureOut">
               <a:rPr lang="en-AU" smtClean="0"/>
-              <a:t>18/06/2024</a:t>
+              <a:t>21/06/2024</a:t>
             </a:fld>
             <a:endParaRPr lang="en-AU"/>
           </a:p>
@@ -2941,7 +3075,7 @@
           <a:p>
             <a:fld id="{6A437CCC-AC60-44D6-AE7F-98F74AF7C374}" type="datetimeFigureOut">
               <a:rPr lang="en-AU" smtClean="0"/>
-              <a:t>18/06/2024</a:t>
+              <a:t>21/06/2024</a:t>
             </a:fld>
             <a:endParaRPr lang="en-AU"/>
           </a:p>
@@ -5119,6 +5253,303 @@
 </p:sld>
 </file>
 
+<file path=ppt/slides/slide2.xml><?xml version="1.0" encoding="utf-8"?>
+<p:sld xmlns:a="http://schemas.openxmlformats.org/drawingml/2006/main" xmlns:r="http://schemas.openxmlformats.org/officeDocument/2006/relationships" xmlns:p="http://schemas.openxmlformats.org/presentationml/2006/main">
+  <p:cSld>
+    <p:spTree>
+      <p:nvGrpSpPr>
+        <p:cNvPr id="1" name=""/>
+        <p:cNvGrpSpPr/>
+        <p:nvPr/>
+      </p:nvGrpSpPr>
+      <p:grpSpPr>
+        <a:xfrm>
+          <a:off x="0" y="0"/>
+          <a:ext cx="0" cy="0"/>
+          <a:chOff x="0" y="0"/>
+          <a:chExt cx="0" cy="0"/>
+        </a:xfrm>
+      </p:grpSpPr>
+      <p:grpSp>
+        <p:nvGrpSpPr>
+          <p:cNvPr id="6" name="Group 5">
+            <a:extLst>
+              <a:ext uri="{FF2B5EF4-FFF2-40B4-BE49-F238E27FC236}">
+                <a16:creationId xmlns:a16="http://schemas.microsoft.com/office/drawing/2014/main" id="{2582EA95-D663-7AC8-584D-9D64D80C5D1E}"/>
+              </a:ext>
+            </a:extLst>
+          </p:cNvPr>
+          <p:cNvGrpSpPr/>
+          <p:nvPr/>
+        </p:nvGrpSpPr>
+        <p:grpSpPr>
+          <a:xfrm>
+            <a:off x="0" y="28841"/>
+            <a:ext cx="12192000" cy="6800318"/>
+            <a:chOff x="1314450" y="762000"/>
+            <a:chExt cx="9563100" cy="5334000"/>
+          </a:xfrm>
+        </p:grpSpPr>
+        <p:pic>
+          <p:nvPicPr>
+            <p:cNvPr id="5" name="Picture 4">
+              <a:extLst>
+                <a:ext uri="{FF2B5EF4-FFF2-40B4-BE49-F238E27FC236}">
+                  <a16:creationId xmlns:a16="http://schemas.microsoft.com/office/drawing/2014/main" id="{93C1270F-60F2-D8D5-91BB-7885A6DE3F41}"/>
+                </a:ext>
+              </a:extLst>
+            </p:cNvPr>
+            <p:cNvPicPr>
+              <a:picLocks noChangeAspect="1"/>
+            </p:cNvPicPr>
+            <p:nvPr/>
+          </p:nvPicPr>
+          <p:blipFill>
+            <a:blip r:embed="rId2"/>
+            <a:stretch>
+              <a:fillRect/>
+            </a:stretch>
+          </p:blipFill>
+          <p:spPr>
+            <a:xfrm>
+              <a:off x="1314450" y="762000"/>
+              <a:ext cx="9563100" cy="5334000"/>
+            </a:xfrm>
+            <a:prstGeom prst="rect">
+              <a:avLst/>
+            </a:prstGeom>
+          </p:spPr>
+        </p:pic>
+        <p:pic>
+          <p:nvPicPr>
+            <p:cNvPr id="8" name="Picture 7">
+              <a:extLst>
+                <a:ext uri="{FF2B5EF4-FFF2-40B4-BE49-F238E27FC236}">
+                  <a16:creationId xmlns:a16="http://schemas.microsoft.com/office/drawing/2014/main" id="{1052F1E1-161E-A6F1-996A-1672DF1452BC}"/>
+                </a:ext>
+              </a:extLst>
+            </p:cNvPr>
+            <p:cNvPicPr>
+              <a:picLocks noChangeAspect="1"/>
+            </p:cNvPicPr>
+            <p:nvPr/>
+          </p:nvPicPr>
+          <p:blipFill rotWithShape="1">
+            <a:blip r:embed="rId3">
+              <a:clrChange>
+                <a:clrFrom>
+                  <a:srgbClr val="FFFFFF"/>
+                </a:clrFrom>
+                <a:clrTo>
+                  <a:srgbClr val="FFFFFF">
+                    <a:alpha val="0"/>
+                  </a:srgbClr>
+                </a:clrTo>
+              </a:clrChange>
+              <a:alphaModFix/>
+              <a:duotone>
+                <a:prstClr val="black"/>
+                <a:schemeClr val="accent4">
+                  <a:tint val="45000"/>
+                  <a:satMod val="400000"/>
+                </a:schemeClr>
+              </a:duotone>
+              <a:extLst>
+                <a:ext uri="{BEBA8EAE-BF5A-486C-A8C5-ECC9F3942E4B}">
+                  <a14:imgProps xmlns:a14="http://schemas.microsoft.com/office/drawing/2010/main">
+                    <a14:imgLayer r:embed="rId4">
+                      <a14:imgEffect>
+                        <a14:brightnessContrast bright="20000" contrast="40000"/>
+                      </a14:imgEffect>
+                    </a14:imgLayer>
+                  </a14:imgProps>
+                </a:ext>
+              </a:extLst>
+            </a:blip>
+            <a:srcRect l="6998" t="5484" r="932" b="9493"/>
+            <a:stretch/>
+          </p:blipFill>
+          <p:spPr>
+            <a:xfrm>
+              <a:off x="1983658" y="1054510"/>
+              <a:ext cx="8804787" cy="4535129"/>
+            </a:xfrm>
+            <a:prstGeom prst="rect">
+              <a:avLst/>
+            </a:prstGeom>
+          </p:spPr>
+        </p:pic>
+      </p:grpSp>
+      <p:sp>
+        <p:nvSpPr>
+          <p:cNvPr id="9" name="Callout: Line 8">
+            <a:extLst>
+              <a:ext uri="{FF2B5EF4-FFF2-40B4-BE49-F238E27FC236}">
+                <a16:creationId xmlns:a16="http://schemas.microsoft.com/office/drawing/2014/main" id="{C04B72FF-7C27-4960-6C49-A1D5718AD5B5}"/>
+              </a:ext>
+            </a:extLst>
+          </p:cNvPr>
+          <p:cNvSpPr/>
+          <p:nvPr/>
+        </p:nvSpPr>
+        <p:spPr>
+          <a:xfrm flipH="1">
+            <a:off x="7012858" y="2114708"/>
+            <a:ext cx="1747684" cy="842343"/>
+          </a:xfrm>
+          <a:prstGeom prst="borderCallout1">
+            <a:avLst>
+              <a:gd name="adj1" fmla="val 18750"/>
+              <a:gd name="adj2" fmla="val -8333"/>
+              <a:gd name="adj3" fmla="val -53833"/>
+              <a:gd name="adj4" fmla="val -44240"/>
+            </a:avLst>
+          </a:prstGeom>
+          <a:ln>
+            <a:solidFill>
+              <a:schemeClr val="accent1"/>
+            </a:solidFill>
+            <a:headEnd type="none" w="med" len="med"/>
+            <a:tailEnd type="triangle" w="med" len="med"/>
+          </a:ln>
+        </p:spPr>
+        <p:style>
+          <a:lnRef idx="2">
+            <a:schemeClr val="accent1">
+              <a:shade val="15000"/>
+            </a:schemeClr>
+          </a:lnRef>
+          <a:fillRef idx="1">
+            <a:schemeClr val="accent1"/>
+          </a:fillRef>
+          <a:effectRef idx="0">
+            <a:schemeClr val="accent1"/>
+          </a:effectRef>
+          <a:fontRef idx="minor">
+            <a:schemeClr val="lt1"/>
+          </a:fontRef>
+        </p:style>
+        <p:txBody>
+          <a:bodyPr rtlCol="0" anchor="ctr"/>
+          <a:lstStyle/>
+          <a:p>
+            <a:pPr algn="ctr"/>
+            <a:r>
+              <a:rPr lang="en-AU" dirty="0"/>
+              <a:t>Single C7+ Pseudo-pure Fluid</a:t>
+            </a:r>
+          </a:p>
+        </p:txBody>
+      </p:sp>
+      <p:sp>
+        <p:nvSpPr>
+          <p:cNvPr id="10" name="Callout: Line 9">
+            <a:extLst>
+              <a:ext uri="{FF2B5EF4-FFF2-40B4-BE49-F238E27FC236}">
+                <a16:creationId xmlns:a16="http://schemas.microsoft.com/office/drawing/2014/main" id="{236F9E0E-C9D3-2A03-7FE8-7B6107A38C9D}"/>
+              </a:ext>
+            </a:extLst>
+          </p:cNvPr>
+          <p:cNvSpPr/>
+          <p:nvPr/>
+        </p:nvSpPr>
+        <p:spPr>
+          <a:xfrm flipH="1">
+            <a:off x="8265461" y="3135579"/>
+            <a:ext cx="1747684" cy="842343"/>
+          </a:xfrm>
+          <a:prstGeom prst="borderCallout1">
+            <a:avLst>
+              <a:gd name="adj1" fmla="val 18750"/>
+              <a:gd name="adj2" fmla="val -8333"/>
+              <a:gd name="adj3" fmla="val -53833"/>
+              <a:gd name="adj4" fmla="val -44240"/>
+            </a:avLst>
+          </a:prstGeom>
+          <a:solidFill>
+            <a:schemeClr val="bg1">
+              <a:lumMod val="50000"/>
+            </a:schemeClr>
+          </a:solidFill>
+          <a:ln>
+            <a:solidFill>
+              <a:schemeClr val="tx1"/>
+            </a:solidFill>
+            <a:headEnd type="none" w="med" len="med"/>
+            <a:tailEnd type="triangle" w="med" len="med"/>
+          </a:ln>
+        </p:spPr>
+        <p:style>
+          <a:lnRef idx="2">
+            <a:schemeClr val="accent1">
+              <a:shade val="15000"/>
+            </a:schemeClr>
+          </a:lnRef>
+          <a:fillRef idx="1">
+            <a:schemeClr val="accent1"/>
+          </a:fillRef>
+          <a:effectRef idx="0">
+            <a:schemeClr val="accent1"/>
+          </a:effectRef>
+          <a:fontRef idx="minor">
+            <a:schemeClr val="lt1"/>
+          </a:fontRef>
+        </p:style>
+        <p:txBody>
+          <a:bodyPr rtlCol="0" anchor="ctr"/>
+          <a:lstStyle/>
+          <a:p>
+            <a:pPr algn="ctr"/>
+            <a:r>
+              <a:rPr lang="en-AU" dirty="0"/>
+              <a:t>Split C7+ using Gamma Distribution</a:t>
+            </a:r>
+          </a:p>
+        </p:txBody>
+      </p:sp>
+    </p:spTree>
+    <p:extLst>
+      <p:ext uri="{BB962C8B-B14F-4D97-AF65-F5344CB8AC3E}">
+        <p14:creationId xmlns:p14="http://schemas.microsoft.com/office/powerpoint/2010/main" val="997275920"/>
+      </p:ext>
+    </p:extLst>
+  </p:cSld>
+  <p:clrMapOvr>
+    <a:masterClrMapping/>
+  </p:clrMapOvr>
+</p:sld>
+</file>
+
+<file path=ppt/slides/slide3.xml><?xml version="1.0" encoding="utf-8"?>
+<p:sld xmlns:a="http://schemas.openxmlformats.org/drawingml/2006/main" xmlns:r="http://schemas.openxmlformats.org/officeDocument/2006/relationships" xmlns:p="http://schemas.openxmlformats.org/presentationml/2006/main">
+  <p:cSld>
+    <p:spTree>
+      <p:nvGrpSpPr>
+        <p:cNvPr id="1" name=""/>
+        <p:cNvGrpSpPr/>
+        <p:nvPr/>
+      </p:nvGrpSpPr>
+      <p:grpSpPr>
+        <a:xfrm>
+          <a:off x="0" y="0"/>
+          <a:ext cx="0" cy="0"/>
+          <a:chOff x="0" y="0"/>
+          <a:chExt cx="0" cy="0"/>
+        </a:xfrm>
+      </p:grpSpPr>
+    </p:spTree>
+    <p:extLst>
+      <p:ext uri="{BB962C8B-B14F-4D97-AF65-F5344CB8AC3E}">
+        <p14:creationId xmlns:p14="http://schemas.microsoft.com/office/powerpoint/2010/main" val="2807728461"/>
+      </p:ext>
+    </p:extLst>
+  </p:cSld>
+  <p:clrMapOvr>
+    <a:masterClrMapping/>
+  </p:clrMapOvr>
+</p:sld>
+</file>
+
 <file path=ppt/theme/theme1.xml><?xml version="1.0" encoding="utf-8"?>
 <a:theme xmlns:a="http://schemas.openxmlformats.org/drawingml/2006/main" name="Office Theme">
   <a:themeElements>

</xml_diff>

<commit_message>
Update PVT Tool Post Images
Updated images to use updated layout for tool, including colour legend.
</commit_message>
<xml_diff>
--- a/images/Pyrus/pvt-fluid-properties-tool/pvt-fluid-properties-tool-figures.pptx
+++ b/images/Pyrus/pvt-fluid-properties-tool/pvt-fluid-properties-tool-figures.pptx
@@ -406,7 +406,7 @@
           <a:p>
             <a:fld id="{6A437CCC-AC60-44D6-AE7F-98F74AF7C374}" type="datetimeFigureOut">
               <a:rPr lang="en-AU" smtClean="0"/>
-              <a:t>21/06/2024</a:t>
+              <a:t>23/07/2024</a:t>
             </a:fld>
             <a:endParaRPr lang="en-AU"/>
           </a:p>
@@ -606,7 +606,7 @@
           <a:p>
             <a:fld id="{6A437CCC-AC60-44D6-AE7F-98F74AF7C374}" type="datetimeFigureOut">
               <a:rPr lang="en-AU" smtClean="0"/>
-              <a:t>21/06/2024</a:t>
+              <a:t>23/07/2024</a:t>
             </a:fld>
             <a:endParaRPr lang="en-AU"/>
           </a:p>
@@ -816,7 +816,7 @@
           <a:p>
             <a:fld id="{6A437CCC-AC60-44D6-AE7F-98F74AF7C374}" type="datetimeFigureOut">
               <a:rPr lang="en-AU" smtClean="0"/>
-              <a:t>21/06/2024</a:t>
+              <a:t>23/07/2024</a:t>
             </a:fld>
             <a:endParaRPr lang="en-AU"/>
           </a:p>
@@ -1016,7 +1016,7 @@
           <a:p>
             <a:fld id="{6A437CCC-AC60-44D6-AE7F-98F74AF7C374}" type="datetimeFigureOut">
               <a:rPr lang="en-AU" smtClean="0"/>
-              <a:t>21/06/2024</a:t>
+              <a:t>23/07/2024</a:t>
             </a:fld>
             <a:endParaRPr lang="en-AU"/>
           </a:p>
@@ -1292,7 +1292,7 @@
           <a:p>
             <a:fld id="{6A437CCC-AC60-44D6-AE7F-98F74AF7C374}" type="datetimeFigureOut">
               <a:rPr lang="en-AU" smtClean="0"/>
-              <a:t>21/06/2024</a:t>
+              <a:t>23/07/2024</a:t>
             </a:fld>
             <a:endParaRPr lang="en-AU"/>
           </a:p>
@@ -1560,7 +1560,7 @@
           <a:p>
             <a:fld id="{6A437CCC-AC60-44D6-AE7F-98F74AF7C374}" type="datetimeFigureOut">
               <a:rPr lang="en-AU" smtClean="0"/>
-              <a:t>21/06/2024</a:t>
+              <a:t>23/07/2024</a:t>
             </a:fld>
             <a:endParaRPr lang="en-AU"/>
           </a:p>
@@ -1975,7 +1975,7 @@
           <a:p>
             <a:fld id="{6A437CCC-AC60-44D6-AE7F-98F74AF7C374}" type="datetimeFigureOut">
               <a:rPr lang="en-AU" smtClean="0"/>
-              <a:t>21/06/2024</a:t>
+              <a:t>23/07/2024</a:t>
             </a:fld>
             <a:endParaRPr lang="en-AU"/>
           </a:p>
@@ -2117,7 +2117,7 @@
           <a:p>
             <a:fld id="{6A437CCC-AC60-44D6-AE7F-98F74AF7C374}" type="datetimeFigureOut">
               <a:rPr lang="en-AU" smtClean="0"/>
-              <a:t>21/06/2024</a:t>
+              <a:t>23/07/2024</a:t>
             </a:fld>
             <a:endParaRPr lang="en-AU"/>
           </a:p>
@@ -2230,7 +2230,7 @@
           <a:p>
             <a:fld id="{6A437CCC-AC60-44D6-AE7F-98F74AF7C374}" type="datetimeFigureOut">
               <a:rPr lang="en-AU" smtClean="0"/>
-              <a:t>21/06/2024</a:t>
+              <a:t>23/07/2024</a:t>
             </a:fld>
             <a:endParaRPr lang="en-AU"/>
           </a:p>
@@ -2543,7 +2543,7 @@
           <a:p>
             <a:fld id="{6A437CCC-AC60-44D6-AE7F-98F74AF7C374}" type="datetimeFigureOut">
               <a:rPr lang="en-AU" smtClean="0"/>
-              <a:t>21/06/2024</a:t>
+              <a:t>23/07/2024</a:t>
             </a:fld>
             <a:endParaRPr lang="en-AU"/>
           </a:p>
@@ -2832,7 +2832,7 @@
           <a:p>
             <a:fld id="{6A437CCC-AC60-44D6-AE7F-98F74AF7C374}" type="datetimeFigureOut">
               <a:rPr lang="en-AU" smtClean="0"/>
-              <a:t>21/06/2024</a:t>
+              <a:t>23/07/2024</a:t>
             </a:fld>
             <a:endParaRPr lang="en-AU"/>
           </a:p>
@@ -3075,7 +3075,7 @@
           <a:p>
             <a:fld id="{6A437CCC-AC60-44D6-AE7F-98F74AF7C374}" type="datetimeFigureOut">
               <a:rPr lang="en-AU" smtClean="0"/>
-              <a:t>21/06/2024</a:t>
+              <a:t>23/07/2024</a:t>
             </a:fld>
             <a:endParaRPr lang="en-AU"/>
           </a:p>
@@ -3494,10 +3494,10 @@
       </p:grpSpPr>
       <p:pic>
         <p:nvPicPr>
-          <p:cNvPr id="5" name="Picture 4">
-            <a:extLst>
-              <a:ext uri="{FF2B5EF4-FFF2-40B4-BE49-F238E27FC236}">
-                <a16:creationId xmlns:a16="http://schemas.microsoft.com/office/drawing/2014/main" id="{C428EF4D-9E34-433C-01FE-36BDACC340BF}"/>
+          <p:cNvPr id="3" name="Picture 2" descr="A screenshot of a computer&#10;&#10;Description automatically generated">
+            <a:extLst>
+              <a:ext uri="{FF2B5EF4-FFF2-40B4-BE49-F238E27FC236}">
+                <a16:creationId xmlns:a16="http://schemas.microsoft.com/office/drawing/2014/main" id="{F169A07C-BB36-3BD2-29FD-A2CC4E8076BB}"/>
               </a:ext>
             </a:extLst>
           </p:cNvPr>
@@ -3507,15 +3507,21 @@
           <p:nvPr/>
         </p:nvPicPr>
         <p:blipFill>
-          <a:blip r:embed="rId2"/>
+          <a:blip r:embed="rId2">
+            <a:extLst>
+              <a:ext uri="{28A0092B-C50C-407E-A947-70E740481C1C}">
+                <a14:useLocalDpi xmlns:a14="http://schemas.microsoft.com/office/drawing/2010/main" val="0"/>
+              </a:ext>
+            </a:extLst>
+          </a:blip>
           <a:stretch>
             <a:fillRect/>
           </a:stretch>
         </p:blipFill>
         <p:spPr>
           <a:xfrm>
-            <a:off x="1395970" y="0"/>
-            <a:ext cx="9400059" cy="6858000"/>
+            <a:off x="1542530" y="0"/>
+            <a:ext cx="9106939" cy="6858000"/>
           </a:xfrm>
           <a:prstGeom prst="rect">
             <a:avLst/>
@@ -3536,7 +3542,7 @@
         </p:nvSpPr>
         <p:spPr>
           <a:xfrm>
-            <a:off x="1409178" y="244257"/>
+            <a:off x="1550910" y="244257"/>
             <a:ext cx="2880985" cy="2956143"/>
           </a:xfrm>
           <a:custGeom>
@@ -3820,7 +3826,7 @@
         </p:nvSpPr>
         <p:spPr>
           <a:xfrm>
-            <a:off x="1409178" y="3231715"/>
+            <a:off x="1550910" y="3231715"/>
             <a:ext cx="2880985" cy="3350711"/>
           </a:xfrm>
           <a:custGeom>
@@ -4094,74 +4100,68 @@
         </p:nvSpPr>
         <p:spPr>
           <a:xfrm>
-            <a:off x="4327741" y="501041"/>
-            <a:ext cx="6425853" cy="2430050"/>
+            <a:off x="4511197" y="501041"/>
+            <a:ext cx="6090900" cy="2430050"/>
           </a:xfrm>
           <a:custGeom>
             <a:avLst/>
             <a:gdLst>
-              <a:gd name="connsiteX0" fmla="*/ 0 w 6425853"/>
+              <a:gd name="connsiteX0" fmla="*/ 0 w 6090900"/>
               <a:gd name="connsiteY0" fmla="*/ 0 h 2430050"/>
-              <a:gd name="connsiteX1" fmla="*/ 449810 w 6425853"/>
+              <a:gd name="connsiteX1" fmla="*/ 494040 w 6090900"/>
               <a:gd name="connsiteY1" fmla="*/ 0 h 2430050"/>
-              <a:gd name="connsiteX2" fmla="*/ 899619 w 6425853"/>
+              <a:gd name="connsiteX2" fmla="*/ 988079 w 6090900"/>
               <a:gd name="connsiteY2" fmla="*/ 0 h 2430050"/>
-              <a:gd name="connsiteX3" fmla="*/ 1349429 w 6425853"/>
+              <a:gd name="connsiteX3" fmla="*/ 1482119 w 6090900"/>
               <a:gd name="connsiteY3" fmla="*/ 0 h 2430050"/>
-              <a:gd name="connsiteX4" fmla="*/ 1992014 w 6425853"/>
+              <a:gd name="connsiteX4" fmla="*/ 2158886 w 6090900"/>
               <a:gd name="connsiteY4" fmla="*/ 0 h 2430050"/>
-              <a:gd name="connsiteX5" fmla="*/ 2763117 w 6425853"/>
+              <a:gd name="connsiteX5" fmla="*/ 2957470 w 6090900"/>
               <a:gd name="connsiteY5" fmla="*/ 0 h 2430050"/>
-              <a:gd name="connsiteX6" fmla="*/ 3212927 w 6425853"/>
+              <a:gd name="connsiteX6" fmla="*/ 3451510 w 6090900"/>
               <a:gd name="connsiteY6" fmla="*/ 0 h 2430050"/>
-              <a:gd name="connsiteX7" fmla="*/ 3662736 w 6425853"/>
+              <a:gd name="connsiteX7" fmla="*/ 3945550 w 6090900"/>
               <a:gd name="connsiteY7" fmla="*/ 0 h 2430050"/>
-              <a:gd name="connsiteX8" fmla="*/ 4241063 w 6425853"/>
+              <a:gd name="connsiteX8" fmla="*/ 4561407 w 6090900"/>
               <a:gd name="connsiteY8" fmla="*/ 0 h 2430050"/>
-              <a:gd name="connsiteX9" fmla="*/ 4883648 w 6425853"/>
+              <a:gd name="connsiteX9" fmla="*/ 5238174 w 6090900"/>
               <a:gd name="connsiteY9" fmla="*/ 0 h 2430050"/>
-              <a:gd name="connsiteX10" fmla="*/ 5333458 w 6425853"/>
+              <a:gd name="connsiteX10" fmla="*/ 6090900 w 6090900"/>
               <a:gd name="connsiteY10" fmla="*/ 0 h 2430050"/>
-              <a:gd name="connsiteX11" fmla="*/ 5847526 w 6425853"/>
-              <a:gd name="connsiteY11" fmla="*/ 0 h 2430050"/>
-              <a:gd name="connsiteX12" fmla="*/ 6425853 w 6425853"/>
-              <a:gd name="connsiteY12" fmla="*/ 0 h 2430050"/>
-              <a:gd name="connsiteX13" fmla="*/ 6425853 w 6425853"/>
-              <a:gd name="connsiteY13" fmla="*/ 656114 h 2430050"/>
-              <a:gd name="connsiteX14" fmla="*/ 6425853 w 6425853"/>
-              <a:gd name="connsiteY14" fmla="*/ 1190725 h 2430050"/>
-              <a:gd name="connsiteX15" fmla="*/ 6425853 w 6425853"/>
-              <a:gd name="connsiteY15" fmla="*/ 1773937 h 2430050"/>
-              <a:gd name="connsiteX16" fmla="*/ 6425853 w 6425853"/>
+              <a:gd name="connsiteX11" fmla="*/ 6090900 w 6090900"/>
+              <a:gd name="connsiteY11" fmla="*/ 558912 h 2430050"/>
+              <a:gd name="connsiteX12" fmla="*/ 6090900 w 6090900"/>
+              <a:gd name="connsiteY12" fmla="*/ 1190725 h 2430050"/>
+              <a:gd name="connsiteX13" fmla="*/ 6090900 w 6090900"/>
+              <a:gd name="connsiteY13" fmla="*/ 1749636 h 2430050"/>
+              <a:gd name="connsiteX14" fmla="*/ 6090900 w 6090900"/>
+              <a:gd name="connsiteY14" fmla="*/ 2430050 h 2430050"/>
+              <a:gd name="connsiteX15" fmla="*/ 5475042 w 6090900"/>
+              <a:gd name="connsiteY15" fmla="*/ 2430050 h 2430050"/>
+              <a:gd name="connsiteX16" fmla="*/ 4920094 w 6090900"/>
               <a:gd name="connsiteY16" fmla="*/ 2430050 h 2430050"/>
-              <a:gd name="connsiteX17" fmla="*/ 5654751 w 6425853"/>
+              <a:gd name="connsiteX17" fmla="*/ 4304236 w 6090900"/>
               <a:gd name="connsiteY17" fmla="*/ 2430050 h 2430050"/>
-              <a:gd name="connsiteX18" fmla="*/ 4947907 w 6425853"/>
+              <a:gd name="connsiteX18" fmla="*/ 3566560 w 6090900"/>
               <a:gd name="connsiteY18" fmla="*/ 2430050 h 2430050"/>
-              <a:gd name="connsiteX19" fmla="*/ 4369580 w 6425853"/>
+              <a:gd name="connsiteX19" fmla="*/ 2950703 w 6090900"/>
               <a:gd name="connsiteY19" fmla="*/ 2430050 h 2430050"/>
-              <a:gd name="connsiteX20" fmla="*/ 3855512 w 6425853"/>
+              <a:gd name="connsiteX20" fmla="*/ 2395754 w 6090900"/>
               <a:gd name="connsiteY20" fmla="*/ 2430050 h 2430050"/>
-              <a:gd name="connsiteX21" fmla="*/ 3084409 w 6425853"/>
+              <a:gd name="connsiteX21" fmla="*/ 1597169 w 6090900"/>
               <a:gd name="connsiteY21" fmla="*/ 2430050 h 2430050"/>
-              <a:gd name="connsiteX22" fmla="*/ 2441824 w 6425853"/>
+              <a:gd name="connsiteX22" fmla="*/ 920403 w 6090900"/>
               <a:gd name="connsiteY22" fmla="*/ 2430050 h 2430050"/>
-              <a:gd name="connsiteX23" fmla="*/ 1799239 w 6425853"/>
+              <a:gd name="connsiteX23" fmla="*/ 0 w 6090900"/>
               <a:gd name="connsiteY23" fmla="*/ 2430050 h 2430050"/>
-              <a:gd name="connsiteX24" fmla="*/ 1349429 w 6425853"/>
-              <a:gd name="connsiteY24" fmla="*/ 2430050 h 2430050"/>
-              <a:gd name="connsiteX25" fmla="*/ 771102 w 6425853"/>
-              <a:gd name="connsiteY25" fmla="*/ 2430050 h 2430050"/>
-              <a:gd name="connsiteX26" fmla="*/ 0 w 6425853"/>
-              <a:gd name="connsiteY26" fmla="*/ 2430050 h 2430050"/>
-              <a:gd name="connsiteX27" fmla="*/ 0 w 6425853"/>
-              <a:gd name="connsiteY27" fmla="*/ 1846838 h 2430050"/>
-              <a:gd name="connsiteX28" fmla="*/ 0 w 6425853"/>
-              <a:gd name="connsiteY28" fmla="*/ 1312227 h 2430050"/>
-              <a:gd name="connsiteX29" fmla="*/ 0 w 6425853"/>
-              <a:gd name="connsiteY29" fmla="*/ 729015 h 2430050"/>
-              <a:gd name="connsiteX30" fmla="*/ 0 w 6425853"/>
-              <a:gd name="connsiteY30" fmla="*/ 0 h 2430050"/>
+              <a:gd name="connsiteX24" fmla="*/ 0 w 6090900"/>
+              <a:gd name="connsiteY24" fmla="*/ 1895439 h 2430050"/>
+              <a:gd name="connsiteX25" fmla="*/ 0 w 6090900"/>
+              <a:gd name="connsiteY25" fmla="*/ 1263626 h 2430050"/>
+              <a:gd name="connsiteX26" fmla="*/ 0 w 6090900"/>
+              <a:gd name="connsiteY26" fmla="*/ 656114 h 2430050"/>
+              <a:gd name="connsiteX27" fmla="*/ 0 w 6090900"/>
+              <a:gd name="connsiteY27" fmla="*/ 0 h 2430050"/>
             </a:gdLst>
             <a:ahLst/>
             <a:cxnLst>
@@ -4249,170 +4249,146 @@
               <a:cxn ang="0">
                 <a:pos x="connsiteX27" y="connsiteY27"/>
               </a:cxn>
-              <a:cxn ang="0">
-                <a:pos x="connsiteX28" y="connsiteY28"/>
-              </a:cxn>
-              <a:cxn ang="0">
-                <a:pos x="connsiteX29" y="connsiteY29"/>
-              </a:cxn>
-              <a:cxn ang="0">
-                <a:pos x="connsiteX30" y="connsiteY30"/>
-              </a:cxn>
             </a:cxnLst>
             <a:rect l="l" t="t" r="r" b="b"/>
             <a:pathLst>
-              <a:path w="6425853" h="2430050" extrusionOk="0">
+              <a:path w="6090900" h="2430050" extrusionOk="0">
                 <a:moveTo>
                   <a:pt x="0" y="0"/>
                 </a:moveTo>
                 <a:cubicBezTo>
-                  <a:pt x="182158" y="-4789"/>
-                  <a:pt x="302040" y="-12506"/>
-                  <a:pt x="449810" y="0"/>
-                </a:cubicBezTo>
-                <a:cubicBezTo>
-                  <a:pt x="597580" y="12506"/>
-                  <a:pt x="737553" y="11862"/>
-                  <a:pt x="899619" y="0"/>
-                </a:cubicBezTo>
-                <a:cubicBezTo>
-                  <a:pt x="1061685" y="-11862"/>
-                  <a:pt x="1149148" y="-5392"/>
-                  <a:pt x="1349429" y="0"/>
-                </a:cubicBezTo>
-                <a:cubicBezTo>
-                  <a:pt x="1549710" y="5392"/>
-                  <a:pt x="1683071" y="-1604"/>
-                  <a:pt x="1992014" y="0"/>
-                </a:cubicBezTo>
-                <a:cubicBezTo>
-                  <a:pt x="2300958" y="1604"/>
-                  <a:pt x="2589701" y="-34206"/>
-                  <a:pt x="2763117" y="0"/>
-                </a:cubicBezTo>
-                <a:cubicBezTo>
-                  <a:pt x="2936533" y="34206"/>
-                  <a:pt x="3121840" y="18953"/>
-                  <a:pt x="3212927" y="0"/>
-                </a:cubicBezTo>
-                <a:cubicBezTo>
-                  <a:pt x="3304014" y="-18953"/>
-                  <a:pt x="3528394" y="-5670"/>
-                  <a:pt x="3662736" y="0"/>
-                </a:cubicBezTo>
-                <a:cubicBezTo>
-                  <a:pt x="3797078" y="5670"/>
-                  <a:pt x="4089405" y="-18889"/>
-                  <a:pt x="4241063" y="0"/>
-                </a:cubicBezTo>
-                <a:cubicBezTo>
-                  <a:pt x="4392721" y="18889"/>
-                  <a:pt x="4580282" y="-14378"/>
-                  <a:pt x="4883648" y="0"/>
-                </a:cubicBezTo>
-                <a:cubicBezTo>
-                  <a:pt x="5187015" y="14378"/>
-                  <a:pt x="5201078" y="7859"/>
-                  <a:pt x="5333458" y="0"/>
-                </a:cubicBezTo>
-                <a:cubicBezTo>
-                  <a:pt x="5465838" y="-7859"/>
-                  <a:pt x="5675743" y="-24707"/>
-                  <a:pt x="5847526" y="0"/>
-                </a:cubicBezTo>
-                <a:cubicBezTo>
-                  <a:pt x="6019309" y="24707"/>
-                  <a:pt x="6187312" y="-602"/>
-                  <a:pt x="6425853" y="0"/>
-                </a:cubicBezTo>
-                <a:cubicBezTo>
-                  <a:pt x="6444846" y="166080"/>
-                  <a:pt x="6425246" y="371628"/>
-                  <a:pt x="6425853" y="656114"/>
-                </a:cubicBezTo>
-                <a:cubicBezTo>
-                  <a:pt x="6426460" y="940600"/>
-                  <a:pt x="6419955" y="1022477"/>
-                  <a:pt x="6425853" y="1190725"/>
-                </a:cubicBezTo>
-                <a:cubicBezTo>
-                  <a:pt x="6431751" y="1358973"/>
-                  <a:pt x="6445431" y="1652658"/>
-                  <a:pt x="6425853" y="1773937"/>
-                </a:cubicBezTo>
-                <a:cubicBezTo>
-                  <a:pt x="6406275" y="1895216"/>
-                  <a:pt x="6400317" y="2156423"/>
-                  <a:pt x="6425853" y="2430050"/>
-                </a:cubicBezTo>
-                <a:cubicBezTo>
-                  <a:pt x="6269924" y="2392405"/>
-                  <a:pt x="6008270" y="2466537"/>
-                  <a:pt x="5654751" y="2430050"/>
-                </a:cubicBezTo>
-                <a:cubicBezTo>
-                  <a:pt x="5301232" y="2393563"/>
-                  <a:pt x="5250431" y="2443984"/>
-                  <a:pt x="4947907" y="2430050"/>
-                </a:cubicBezTo>
-                <a:cubicBezTo>
-                  <a:pt x="4645383" y="2416116"/>
-                  <a:pt x="4596675" y="2448170"/>
-                  <a:pt x="4369580" y="2430050"/>
-                </a:cubicBezTo>
-                <a:cubicBezTo>
-                  <a:pt x="4142485" y="2411930"/>
-                  <a:pt x="4111098" y="2450415"/>
-                  <a:pt x="3855512" y="2430050"/>
-                </a:cubicBezTo>
-                <a:cubicBezTo>
-                  <a:pt x="3599926" y="2409685"/>
-                  <a:pt x="3244901" y="2394305"/>
-                  <a:pt x="3084409" y="2430050"/>
-                </a:cubicBezTo>
-                <a:cubicBezTo>
-                  <a:pt x="2923917" y="2465795"/>
-                  <a:pt x="2707651" y="2408059"/>
-                  <a:pt x="2441824" y="2430050"/>
-                </a:cubicBezTo>
-                <a:cubicBezTo>
-                  <a:pt x="2175998" y="2452041"/>
-                  <a:pt x="2049793" y="2431098"/>
-                  <a:pt x="1799239" y="2430050"/>
-                </a:cubicBezTo>
-                <a:cubicBezTo>
-                  <a:pt x="1548686" y="2429002"/>
-                  <a:pt x="1442760" y="2428472"/>
-                  <a:pt x="1349429" y="2430050"/>
-                </a:cubicBezTo>
-                <a:cubicBezTo>
-                  <a:pt x="1256098" y="2431629"/>
-                  <a:pt x="977656" y="2449444"/>
-                  <a:pt x="771102" y="2430050"/>
-                </a:cubicBezTo>
-                <a:cubicBezTo>
-                  <a:pt x="564548" y="2410656"/>
-                  <a:pt x="222844" y="2443572"/>
+                  <a:pt x="188095" y="2981"/>
+                  <a:pt x="317116" y="8296"/>
+                  <a:pt x="494040" y="0"/>
+                </a:cubicBezTo>
+                <a:cubicBezTo>
+                  <a:pt x="670964" y="-8296"/>
+                  <a:pt x="820069" y="-16702"/>
+                  <a:pt x="988079" y="0"/>
+                </a:cubicBezTo>
+                <a:cubicBezTo>
+                  <a:pt x="1156089" y="16702"/>
+                  <a:pt x="1251140" y="-11934"/>
+                  <a:pt x="1482119" y="0"/>
+                </a:cubicBezTo>
+                <a:cubicBezTo>
+                  <a:pt x="1713098" y="11934"/>
+                  <a:pt x="1902024" y="5825"/>
+                  <a:pt x="2158886" y="0"/>
+                </a:cubicBezTo>
+                <a:cubicBezTo>
+                  <a:pt x="2415748" y="-5825"/>
+                  <a:pt x="2787311" y="2654"/>
+                  <a:pt x="2957470" y="0"/>
+                </a:cubicBezTo>
+                <a:cubicBezTo>
+                  <a:pt x="3127629" y="-2654"/>
+                  <a:pt x="3310436" y="-9501"/>
+                  <a:pt x="3451510" y="0"/>
+                </a:cubicBezTo>
+                <a:cubicBezTo>
+                  <a:pt x="3592584" y="9501"/>
+                  <a:pt x="3764094" y="1295"/>
+                  <a:pt x="3945550" y="0"/>
+                </a:cubicBezTo>
+                <a:cubicBezTo>
+                  <a:pt x="4127006" y="-1295"/>
+                  <a:pt x="4390133" y="-23089"/>
+                  <a:pt x="4561407" y="0"/>
+                </a:cubicBezTo>
+                <a:cubicBezTo>
+                  <a:pt x="4732681" y="23089"/>
+                  <a:pt x="5023845" y="-1918"/>
+                  <a:pt x="5238174" y="0"/>
+                </a:cubicBezTo>
+                <a:cubicBezTo>
+                  <a:pt x="5452503" y="1918"/>
+                  <a:pt x="5701540" y="-30004"/>
+                  <a:pt x="6090900" y="0"/>
+                </a:cubicBezTo>
+                <a:cubicBezTo>
+                  <a:pt x="6117347" y="188551"/>
+                  <a:pt x="6099759" y="330137"/>
+                  <a:pt x="6090900" y="558912"/>
+                </a:cubicBezTo>
+                <a:cubicBezTo>
+                  <a:pt x="6082041" y="787687"/>
+                  <a:pt x="6109517" y="1007850"/>
+                  <a:pt x="6090900" y="1190725"/>
+                </a:cubicBezTo>
+                <a:cubicBezTo>
+                  <a:pt x="6072283" y="1373600"/>
+                  <a:pt x="6077866" y="1544939"/>
+                  <a:pt x="6090900" y="1749636"/>
+                </a:cubicBezTo>
+                <a:cubicBezTo>
+                  <a:pt x="6103934" y="1954333"/>
+                  <a:pt x="6058271" y="2291018"/>
+                  <a:pt x="6090900" y="2430050"/>
+                </a:cubicBezTo>
+                <a:cubicBezTo>
+                  <a:pt x="5867305" y="2431692"/>
+                  <a:pt x="5599775" y="2408928"/>
+                  <a:pt x="5475042" y="2430050"/>
+                </a:cubicBezTo>
+                <a:cubicBezTo>
+                  <a:pt x="5350309" y="2451172"/>
+                  <a:pt x="5074724" y="2423335"/>
+                  <a:pt x="4920094" y="2430050"/>
+                </a:cubicBezTo>
+                <a:cubicBezTo>
+                  <a:pt x="4765464" y="2436765"/>
+                  <a:pt x="4495741" y="2454803"/>
+                  <a:pt x="4304236" y="2430050"/>
+                </a:cubicBezTo>
+                <a:cubicBezTo>
+                  <a:pt x="4112731" y="2405297"/>
+                  <a:pt x="3888701" y="2425542"/>
+                  <a:pt x="3566560" y="2430050"/>
+                </a:cubicBezTo>
+                <a:cubicBezTo>
+                  <a:pt x="3244419" y="2434558"/>
+                  <a:pt x="3117361" y="2413758"/>
+                  <a:pt x="2950703" y="2430050"/>
+                </a:cubicBezTo>
+                <a:cubicBezTo>
+                  <a:pt x="2784045" y="2446342"/>
+                  <a:pt x="2669853" y="2433915"/>
+                  <a:pt x="2395754" y="2430050"/>
+                </a:cubicBezTo>
+                <a:cubicBezTo>
+                  <a:pt x="2121655" y="2426185"/>
+                  <a:pt x="1847012" y="2449861"/>
+                  <a:pt x="1597169" y="2430050"/>
+                </a:cubicBezTo>
+                <a:cubicBezTo>
+                  <a:pt x="1347327" y="2410239"/>
+                  <a:pt x="1170725" y="2446317"/>
+                  <a:pt x="920403" y="2430050"/>
+                </a:cubicBezTo>
+                <a:cubicBezTo>
+                  <a:pt x="670081" y="2413783"/>
+                  <a:pt x="409519" y="2388607"/>
                   <a:pt x="0" y="2430050"/>
                 </a:cubicBezTo>
                 <a:cubicBezTo>
-                  <a:pt x="-4640" y="2142709"/>
-                  <a:pt x="-14667" y="1982288"/>
-                  <a:pt x="0" y="1846838"/>
-                </a:cubicBezTo>
-                <a:cubicBezTo>
-                  <a:pt x="14667" y="1711388"/>
-                  <a:pt x="-12150" y="1522992"/>
-                  <a:pt x="0" y="1312227"/>
-                </a:cubicBezTo>
-                <a:cubicBezTo>
-                  <a:pt x="12150" y="1101462"/>
-                  <a:pt x="5110" y="944654"/>
-                  <a:pt x="0" y="729015"/>
-                </a:cubicBezTo>
-                <a:cubicBezTo>
-                  <a:pt x="-5110" y="513376"/>
-                  <a:pt x="10720" y="267598"/>
+                  <a:pt x="2553" y="2180757"/>
+                  <a:pt x="-20447" y="2046902"/>
+                  <a:pt x="0" y="1895439"/>
+                </a:cubicBezTo>
+                <a:cubicBezTo>
+                  <a:pt x="20447" y="1743976"/>
+                  <a:pt x="-6206" y="1551827"/>
+                  <a:pt x="0" y="1263626"/>
+                </a:cubicBezTo>
+                <a:cubicBezTo>
+                  <a:pt x="6206" y="975425"/>
+                  <a:pt x="30163" y="844092"/>
+                  <a:pt x="0" y="656114"/>
+                </a:cubicBezTo>
+                <a:cubicBezTo>
+                  <a:pt x="-30163" y="468136"/>
+                  <a:pt x="434" y="325244"/>
                   <a:pt x="0" y="0"/>
                 </a:cubicBezTo>
                 <a:close/>
@@ -4478,76 +4454,74 @@
         </p:nvSpPr>
         <p:spPr>
           <a:xfrm>
-            <a:off x="4327741" y="2956141"/>
-            <a:ext cx="6425854" cy="3626285"/>
+            <a:off x="4511196" y="2956141"/>
+            <a:ext cx="6090901" cy="3626285"/>
           </a:xfrm>
           <a:custGeom>
             <a:avLst/>
             <a:gdLst>
-              <a:gd name="connsiteX0" fmla="*/ 0 w 6425854"/>
+              <a:gd name="connsiteX0" fmla="*/ 0 w 6090901"/>
               <a:gd name="connsiteY0" fmla="*/ 0 h 3626285"/>
-              <a:gd name="connsiteX1" fmla="*/ 771102 w 6425854"/>
+              <a:gd name="connsiteX1" fmla="*/ 798585 w 6090901"/>
               <a:gd name="connsiteY1" fmla="*/ 0 h 3626285"/>
-              <a:gd name="connsiteX2" fmla="*/ 1413688 w 6425854"/>
+              <a:gd name="connsiteX2" fmla="*/ 1475352 w 6090901"/>
               <a:gd name="connsiteY2" fmla="*/ 0 h 3626285"/>
-              <a:gd name="connsiteX3" fmla="*/ 2056273 w 6425854"/>
+              <a:gd name="connsiteX3" fmla="*/ 2152118 w 6090901"/>
               <a:gd name="connsiteY3" fmla="*/ 0 h 3626285"/>
-              <a:gd name="connsiteX4" fmla="*/ 2763117 w 6425854"/>
+              <a:gd name="connsiteX4" fmla="*/ 2889794 w 6090901"/>
               <a:gd name="connsiteY4" fmla="*/ 0 h 3626285"/>
-              <a:gd name="connsiteX5" fmla="*/ 3534220 w 6425854"/>
+              <a:gd name="connsiteX5" fmla="*/ 3688379 w 6090901"/>
               <a:gd name="connsiteY5" fmla="*/ 0 h 3626285"/>
-              <a:gd name="connsiteX6" fmla="*/ 3984029 w 6425854"/>
+              <a:gd name="connsiteX6" fmla="*/ 4182419 w 6090901"/>
               <a:gd name="connsiteY6" fmla="*/ 0 h 3626285"/>
-              <a:gd name="connsiteX7" fmla="*/ 4626615 w 6425854"/>
+              <a:gd name="connsiteX7" fmla="*/ 4859185 w 6090901"/>
               <a:gd name="connsiteY7" fmla="*/ 0 h 3626285"/>
-              <a:gd name="connsiteX8" fmla="*/ 5204942 w 6425854"/>
+              <a:gd name="connsiteX8" fmla="*/ 5475043 w 6090901"/>
               <a:gd name="connsiteY8" fmla="*/ 0 h 3626285"/>
-              <a:gd name="connsiteX9" fmla="*/ 6425854 w 6425854"/>
+              <a:gd name="connsiteX9" fmla="*/ 6090901 w 6090901"/>
               <a:gd name="connsiteY9" fmla="*/ 0 h 3626285"/>
-              <a:gd name="connsiteX10" fmla="*/ 6425854 w 6425854"/>
+              <a:gd name="connsiteX10" fmla="*/ 6090901 w 6090901"/>
               <a:gd name="connsiteY10" fmla="*/ 604381 h 3626285"/>
-              <a:gd name="connsiteX11" fmla="*/ 6425854 w 6425854"/>
+              <a:gd name="connsiteX11" fmla="*/ 6090901 w 6090901"/>
               <a:gd name="connsiteY11" fmla="*/ 1281287 h 3626285"/>
-              <a:gd name="connsiteX12" fmla="*/ 6425854 w 6425854"/>
+              <a:gd name="connsiteX12" fmla="*/ 6090901 w 6090901"/>
               <a:gd name="connsiteY12" fmla="*/ 1849405 h 3626285"/>
-              <a:gd name="connsiteX13" fmla="*/ 6425854 w 6425854"/>
+              <a:gd name="connsiteX13" fmla="*/ 6090901 w 6090901"/>
               <a:gd name="connsiteY13" fmla="*/ 2453786 h 3626285"/>
-              <a:gd name="connsiteX14" fmla="*/ 6425854 w 6425854"/>
+              <a:gd name="connsiteX14" fmla="*/ 6090901 w 6090901"/>
               <a:gd name="connsiteY14" fmla="*/ 2949378 h 3626285"/>
-              <a:gd name="connsiteX15" fmla="*/ 6425854 w 6425854"/>
+              <a:gd name="connsiteX15" fmla="*/ 6090901 w 6090901"/>
               <a:gd name="connsiteY15" fmla="*/ 3626285 h 3626285"/>
-              <a:gd name="connsiteX16" fmla="*/ 5976044 w 6425854"/>
+              <a:gd name="connsiteX16" fmla="*/ 5596861 w 6090901"/>
               <a:gd name="connsiteY16" fmla="*/ 3626285 h 3626285"/>
-              <a:gd name="connsiteX17" fmla="*/ 5526234 w 6425854"/>
+              <a:gd name="connsiteX17" fmla="*/ 5102822 w 6090901"/>
               <a:gd name="connsiteY17" fmla="*/ 3626285 h 3626285"/>
-              <a:gd name="connsiteX18" fmla="*/ 4755132 w 6425854"/>
+              <a:gd name="connsiteX18" fmla="*/ 4304237 w 6090901"/>
               <a:gd name="connsiteY18" fmla="*/ 3626285 h 3626285"/>
-              <a:gd name="connsiteX19" fmla="*/ 3984029 w 6425854"/>
+              <a:gd name="connsiteX19" fmla="*/ 3505652 w 6090901"/>
               <a:gd name="connsiteY19" fmla="*/ 3626285 h 3626285"/>
-              <a:gd name="connsiteX20" fmla="*/ 3405703 w 6425854"/>
+              <a:gd name="connsiteX20" fmla="*/ 2889794 w 6090901"/>
               <a:gd name="connsiteY20" fmla="*/ 3626285 h 3626285"/>
-              <a:gd name="connsiteX21" fmla="*/ 2698859 w 6425854"/>
+              <a:gd name="connsiteX21" fmla="*/ 2152118 w 6090901"/>
               <a:gd name="connsiteY21" fmla="*/ 3626285 h 3626285"/>
-              <a:gd name="connsiteX22" fmla="*/ 2056273 w 6425854"/>
+              <a:gd name="connsiteX22" fmla="*/ 1475352 w 6090901"/>
               <a:gd name="connsiteY22" fmla="*/ 3626285 h 3626285"/>
-              <a:gd name="connsiteX23" fmla="*/ 1285171 w 6425854"/>
+              <a:gd name="connsiteX23" fmla="*/ 676767 w 6090901"/>
               <a:gd name="connsiteY23" fmla="*/ 3626285 h 3626285"/>
-              <a:gd name="connsiteX24" fmla="*/ 706844 w 6425854"/>
+              <a:gd name="connsiteX24" fmla="*/ 0 w 6090901"/>
               <a:gd name="connsiteY24" fmla="*/ 3626285 h 3626285"/>
-              <a:gd name="connsiteX25" fmla="*/ 0 w 6425854"/>
-              <a:gd name="connsiteY25" fmla="*/ 3626285 h 3626285"/>
-              <a:gd name="connsiteX26" fmla="*/ 0 w 6425854"/>
-              <a:gd name="connsiteY26" fmla="*/ 3094430 h 3626285"/>
-              <a:gd name="connsiteX27" fmla="*/ 0 w 6425854"/>
-              <a:gd name="connsiteY27" fmla="*/ 2417523 h 3626285"/>
-              <a:gd name="connsiteX28" fmla="*/ 0 w 6425854"/>
-              <a:gd name="connsiteY28" fmla="*/ 1813143 h 3626285"/>
-              <a:gd name="connsiteX29" fmla="*/ 0 w 6425854"/>
-              <a:gd name="connsiteY29" fmla="*/ 1172499 h 3626285"/>
-              <a:gd name="connsiteX30" fmla="*/ 0 w 6425854"/>
-              <a:gd name="connsiteY30" fmla="*/ 568118 h 3626285"/>
-              <a:gd name="connsiteX31" fmla="*/ 0 w 6425854"/>
-              <a:gd name="connsiteY31" fmla="*/ 0 h 3626285"/>
+              <a:gd name="connsiteX25" fmla="*/ 0 w 6090901"/>
+              <a:gd name="connsiteY25" fmla="*/ 3094430 h 3626285"/>
+              <a:gd name="connsiteX26" fmla="*/ 0 w 6090901"/>
+              <a:gd name="connsiteY26" fmla="*/ 2490049 h 3626285"/>
+              <a:gd name="connsiteX27" fmla="*/ 0 w 6090901"/>
+              <a:gd name="connsiteY27" fmla="*/ 1813143 h 3626285"/>
+              <a:gd name="connsiteX28" fmla="*/ 0 w 6090901"/>
+              <a:gd name="connsiteY28" fmla="*/ 1208762 h 3626285"/>
+              <a:gd name="connsiteX29" fmla="*/ 0 w 6090901"/>
+              <a:gd name="connsiteY29" fmla="*/ 568118 h 3626285"/>
+              <a:gd name="connsiteX30" fmla="*/ 0 w 6090901"/>
+              <a:gd name="connsiteY30" fmla="*/ 0 h 3626285"/>
             </a:gdLst>
             <a:ahLst/>
             <a:cxnLst>
@@ -4644,169 +4618,161 @@
               <a:cxn ang="0">
                 <a:pos x="connsiteX30" y="connsiteY30"/>
               </a:cxn>
-              <a:cxn ang="0">
-                <a:pos x="connsiteX31" y="connsiteY31"/>
-              </a:cxn>
             </a:cxnLst>
             <a:rect l="l" t="t" r="r" b="b"/>
             <a:pathLst>
-              <a:path w="6425854" h="3626285" extrusionOk="0">
+              <a:path w="6090901" h="3626285" extrusionOk="0">
                 <a:moveTo>
                   <a:pt x="0" y="0"/>
                 </a:moveTo>
                 <a:cubicBezTo>
-                  <a:pt x="244643" y="-21012"/>
-                  <a:pt x="593301" y="-22362"/>
-                  <a:pt x="771102" y="0"/>
-                </a:cubicBezTo>
-                <a:cubicBezTo>
-                  <a:pt x="948903" y="22362"/>
-                  <a:pt x="1167695" y="9161"/>
-                  <a:pt x="1413688" y="0"/>
-                </a:cubicBezTo>
-                <a:cubicBezTo>
-                  <a:pt x="1659681" y="-9161"/>
-                  <a:pt x="1858471" y="-13781"/>
-                  <a:pt x="2056273" y="0"/>
-                </a:cubicBezTo>
-                <a:cubicBezTo>
-                  <a:pt x="2254075" y="13781"/>
-                  <a:pt x="2562958" y="21227"/>
-                  <a:pt x="2763117" y="0"/>
-                </a:cubicBezTo>
-                <a:cubicBezTo>
-                  <a:pt x="2963276" y="-21227"/>
-                  <a:pt x="3265718" y="11361"/>
-                  <a:pt x="3534220" y="0"/>
-                </a:cubicBezTo>
-                <a:cubicBezTo>
-                  <a:pt x="3802722" y="-11361"/>
-                  <a:pt x="3809090" y="-8784"/>
-                  <a:pt x="3984029" y="0"/>
-                </a:cubicBezTo>
-                <a:cubicBezTo>
-                  <a:pt x="4158968" y="8784"/>
-                  <a:pt x="4329514" y="462"/>
-                  <a:pt x="4626615" y="0"/>
-                </a:cubicBezTo>
-                <a:cubicBezTo>
-                  <a:pt x="4923716" y="-462"/>
-                  <a:pt x="5019533" y="-592"/>
-                  <a:pt x="5204942" y="0"/>
-                </a:cubicBezTo>
-                <a:cubicBezTo>
-                  <a:pt x="5390351" y="592"/>
-                  <a:pt x="5854960" y="-34423"/>
-                  <a:pt x="6425854" y="0"/>
-                </a:cubicBezTo>
-                <a:cubicBezTo>
-                  <a:pt x="6420135" y="208399"/>
-                  <a:pt x="6415610" y="378361"/>
-                  <a:pt x="6425854" y="604381"/>
-                </a:cubicBezTo>
-                <a:cubicBezTo>
-                  <a:pt x="6436098" y="830401"/>
-                  <a:pt x="6392840" y="972720"/>
-                  <a:pt x="6425854" y="1281287"/>
-                </a:cubicBezTo>
-                <a:cubicBezTo>
-                  <a:pt x="6458868" y="1589854"/>
-                  <a:pt x="6418469" y="1569710"/>
-                  <a:pt x="6425854" y="1849405"/>
-                </a:cubicBezTo>
-                <a:cubicBezTo>
-                  <a:pt x="6433239" y="2129100"/>
-                  <a:pt x="6441959" y="2242196"/>
-                  <a:pt x="6425854" y="2453786"/>
-                </a:cubicBezTo>
-                <a:cubicBezTo>
-                  <a:pt x="6409749" y="2665376"/>
-                  <a:pt x="6442685" y="2778681"/>
-                  <a:pt x="6425854" y="2949378"/>
-                </a:cubicBezTo>
-                <a:cubicBezTo>
-                  <a:pt x="6409023" y="3120075"/>
-                  <a:pt x="6458268" y="3310516"/>
-                  <a:pt x="6425854" y="3626285"/>
-                </a:cubicBezTo>
-                <a:cubicBezTo>
-                  <a:pt x="6241175" y="3633919"/>
-                  <a:pt x="6127497" y="3627360"/>
-                  <a:pt x="5976044" y="3626285"/>
-                </a:cubicBezTo>
-                <a:cubicBezTo>
-                  <a:pt x="5824591" y="3625211"/>
-                  <a:pt x="5713758" y="3608781"/>
-                  <a:pt x="5526234" y="3626285"/>
-                </a:cubicBezTo>
-                <a:cubicBezTo>
-                  <a:pt x="5338710" y="3643790"/>
-                  <a:pt x="4937857" y="3627965"/>
-                  <a:pt x="4755132" y="3626285"/>
-                </a:cubicBezTo>
-                <a:cubicBezTo>
-                  <a:pt x="4572407" y="3624605"/>
-                  <a:pt x="4311078" y="3612324"/>
-                  <a:pt x="3984029" y="3626285"/>
-                </a:cubicBezTo>
-                <a:cubicBezTo>
-                  <a:pt x="3656980" y="3640246"/>
-                  <a:pt x="3567248" y="3601184"/>
-                  <a:pt x="3405703" y="3626285"/>
-                </a:cubicBezTo>
-                <a:cubicBezTo>
-                  <a:pt x="3244158" y="3651386"/>
-                  <a:pt x="3032035" y="3592262"/>
-                  <a:pt x="2698859" y="3626285"/>
-                </a:cubicBezTo>
-                <a:cubicBezTo>
-                  <a:pt x="2365683" y="3660308"/>
-                  <a:pt x="2288378" y="3651041"/>
-                  <a:pt x="2056273" y="3626285"/>
-                </a:cubicBezTo>
-                <a:cubicBezTo>
-                  <a:pt x="1824168" y="3601529"/>
-                  <a:pt x="1534101" y="3660138"/>
-                  <a:pt x="1285171" y="3626285"/>
-                </a:cubicBezTo>
-                <a:cubicBezTo>
-                  <a:pt x="1036241" y="3592432"/>
-                  <a:pt x="946442" y="3603999"/>
-                  <a:pt x="706844" y="3626285"/>
-                </a:cubicBezTo>
-                <a:cubicBezTo>
-                  <a:pt x="467246" y="3648571"/>
-                  <a:pt x="200450" y="3633492"/>
+                  <a:pt x="268541" y="954"/>
+                  <a:pt x="463014" y="10940"/>
+                  <a:pt x="798585" y="0"/>
+                </a:cubicBezTo>
+                <a:cubicBezTo>
+                  <a:pt x="1134156" y="-10940"/>
+                  <a:pt x="1183156" y="26727"/>
+                  <a:pt x="1475352" y="0"/>
+                </a:cubicBezTo>
+                <a:cubicBezTo>
+                  <a:pt x="1767548" y="-26727"/>
+                  <a:pt x="1986169" y="-10372"/>
+                  <a:pt x="2152118" y="0"/>
+                </a:cubicBezTo>
+                <a:cubicBezTo>
+                  <a:pt x="2318067" y="10372"/>
+                  <a:pt x="2561382" y="2855"/>
+                  <a:pt x="2889794" y="0"/>
+                </a:cubicBezTo>
+                <a:cubicBezTo>
+                  <a:pt x="3218206" y="-2855"/>
+                  <a:pt x="3444953" y="-24542"/>
+                  <a:pt x="3688379" y="0"/>
+                </a:cubicBezTo>
+                <a:cubicBezTo>
+                  <a:pt x="3931805" y="24542"/>
+                  <a:pt x="4008292" y="3040"/>
+                  <a:pt x="4182419" y="0"/>
+                </a:cubicBezTo>
+                <a:cubicBezTo>
+                  <a:pt x="4356546" y="-3040"/>
+                  <a:pt x="4687229" y="23312"/>
+                  <a:pt x="4859185" y="0"/>
+                </a:cubicBezTo>
+                <a:cubicBezTo>
+                  <a:pt x="5031141" y="-23312"/>
+                  <a:pt x="5215192" y="11011"/>
+                  <a:pt x="5475043" y="0"/>
+                </a:cubicBezTo>
+                <a:cubicBezTo>
+                  <a:pt x="5734894" y="-11011"/>
+                  <a:pt x="5897525" y="-15103"/>
+                  <a:pt x="6090901" y="0"/>
+                </a:cubicBezTo>
+                <a:cubicBezTo>
+                  <a:pt x="6085182" y="208399"/>
+                  <a:pt x="6080657" y="378361"/>
+                  <a:pt x="6090901" y="604381"/>
+                </a:cubicBezTo>
+                <a:cubicBezTo>
+                  <a:pt x="6101145" y="830401"/>
+                  <a:pt x="6057887" y="972720"/>
+                  <a:pt x="6090901" y="1281287"/>
+                </a:cubicBezTo>
+                <a:cubicBezTo>
+                  <a:pt x="6123915" y="1589854"/>
+                  <a:pt x="6083516" y="1569710"/>
+                  <a:pt x="6090901" y="1849405"/>
+                </a:cubicBezTo>
+                <a:cubicBezTo>
+                  <a:pt x="6098286" y="2129100"/>
+                  <a:pt x="6107006" y="2242196"/>
+                  <a:pt x="6090901" y="2453786"/>
+                </a:cubicBezTo>
+                <a:cubicBezTo>
+                  <a:pt x="6074796" y="2665376"/>
+                  <a:pt x="6107732" y="2778681"/>
+                  <a:pt x="6090901" y="2949378"/>
+                </a:cubicBezTo>
+                <a:cubicBezTo>
+                  <a:pt x="6074070" y="3120075"/>
+                  <a:pt x="6123315" y="3310516"/>
+                  <a:pt x="6090901" y="3626285"/>
+                </a:cubicBezTo>
+                <a:cubicBezTo>
+                  <a:pt x="5926213" y="3638640"/>
+                  <a:pt x="5708605" y="3639836"/>
+                  <a:pt x="5596861" y="3626285"/>
+                </a:cubicBezTo>
+                <a:cubicBezTo>
+                  <a:pt x="5485117" y="3612734"/>
+                  <a:pt x="5290870" y="3621320"/>
+                  <a:pt x="5102822" y="3626285"/>
+                </a:cubicBezTo>
+                <a:cubicBezTo>
+                  <a:pt x="4914774" y="3631250"/>
+                  <a:pt x="4508869" y="3640000"/>
+                  <a:pt x="4304237" y="3626285"/>
+                </a:cubicBezTo>
+                <a:cubicBezTo>
+                  <a:pt x="4099605" y="3612570"/>
+                  <a:pt x="3742188" y="3663703"/>
+                  <a:pt x="3505652" y="3626285"/>
+                </a:cubicBezTo>
+                <a:cubicBezTo>
+                  <a:pt x="3269116" y="3588867"/>
+                  <a:pt x="3174981" y="3614031"/>
+                  <a:pt x="2889794" y="3626285"/>
+                </a:cubicBezTo>
+                <a:cubicBezTo>
+                  <a:pt x="2604607" y="3638539"/>
+                  <a:pt x="2483276" y="3599674"/>
+                  <a:pt x="2152118" y="3626285"/>
+                </a:cubicBezTo>
+                <a:cubicBezTo>
+                  <a:pt x="1820960" y="3652896"/>
+                  <a:pt x="1626602" y="3655726"/>
+                  <a:pt x="1475352" y="3626285"/>
+                </a:cubicBezTo>
+                <a:cubicBezTo>
+                  <a:pt x="1324102" y="3596844"/>
+                  <a:pt x="992475" y="3588002"/>
+                  <a:pt x="676767" y="3626285"/>
+                </a:cubicBezTo>
+                <a:cubicBezTo>
+                  <a:pt x="361060" y="3664568"/>
+                  <a:pt x="181168" y="3652977"/>
                   <a:pt x="0" y="3626285"/>
                 </a:cubicBezTo>
                 <a:cubicBezTo>
-                  <a:pt x="1825" y="3405411"/>
-                  <a:pt x="-8410" y="3271503"/>
+                  <a:pt x="14937" y="3421207"/>
+                  <a:pt x="2489" y="3314923"/>
                   <a:pt x="0" y="3094430"/>
                 </a:cubicBezTo>
                 <a:cubicBezTo>
-                  <a:pt x="8410" y="2917357"/>
-                  <a:pt x="20082" y="2636361"/>
-                  <a:pt x="0" y="2417523"/>
-                </a:cubicBezTo>
-                <a:cubicBezTo>
-                  <a:pt x="-20082" y="2198685"/>
-                  <a:pt x="10923" y="1972495"/>
+                  <a:pt x="-2489" y="2873938"/>
+                  <a:pt x="-8705" y="2724448"/>
+                  <a:pt x="0" y="2490049"/>
+                </a:cubicBezTo>
+                <a:cubicBezTo>
+                  <a:pt x="8705" y="2255650"/>
+                  <a:pt x="24275" y="2026440"/>
                   <a:pt x="0" y="1813143"/>
                 </a:cubicBezTo>
                 <a:cubicBezTo>
-                  <a:pt x="-10923" y="1653791"/>
-                  <a:pt x="7355" y="1402428"/>
-                  <a:pt x="0" y="1172499"/>
-                </a:cubicBezTo>
-                <a:cubicBezTo>
-                  <a:pt x="-7355" y="942570"/>
-                  <a:pt x="-15420" y="817659"/>
+                  <a:pt x="-24275" y="1599846"/>
+                  <a:pt x="6896" y="1368297"/>
+                  <a:pt x="0" y="1208762"/>
+                </a:cubicBezTo>
+                <a:cubicBezTo>
+                  <a:pt x="-6896" y="1049227"/>
+                  <a:pt x="7355" y="798047"/>
                   <a:pt x="0" y="568118"/>
                 </a:cubicBezTo>
                 <a:cubicBezTo>
-                  <a:pt x="15420" y="318577"/>
-                  <a:pt x="-15389" y="246102"/>
+                  <a:pt x="-7355" y="338189"/>
+                  <a:pt x="-16192" y="191959"/>
                   <a:pt x="0" y="0"/>
                 </a:cubicBezTo>
                 <a:close/>
@@ -5044,7 +5010,7 @@
         </p:nvSpPr>
         <p:spPr>
           <a:xfrm>
-            <a:off x="4327741" y="244257"/>
+            <a:off x="4511196" y="244257"/>
             <a:ext cx="1910221" cy="215443"/>
           </a:xfrm>
           <a:custGeom>
@@ -5208,7 +5174,7 @@
         </p:nvSpPr>
         <p:spPr>
           <a:xfrm>
-            <a:off x="6373320" y="125978"/>
+            <a:off x="6556775" y="125978"/>
             <a:ext cx="1133605" cy="261610"/>
           </a:xfrm>
           <a:prstGeom prst="rect">

</xml_diff>

<commit_message>
Fix Incorrect PVT Tool Image
Fixed image with incorrect outlines.
</commit_message>
<xml_diff>
--- a/images/Pyrus/pvt-fluid-properties-tool/pvt-fluid-properties-tool-figures.pptx
+++ b/images/Pyrus/pvt-fluid-properties-tool/pvt-fluid-properties-tool-figures.pptx
@@ -123,138 +123,6 @@
     </p:ext>
   </p:extLst>
 </p:presentation>
-</file>
-
-<file path=ppt/revisionInfo.xml><?xml version="1.0" encoding="utf-8"?>
-<p1510:revInfo xmlns:a="http://schemas.openxmlformats.org/drawingml/2006/main" xmlns:r="http://schemas.openxmlformats.org/officeDocument/2006/relationships" xmlns:p1510="http://schemas.microsoft.com/office/powerpoint/2015/10/main">
-  <p1510:revLst>
-    <p1510:client id="{194CD0C4-092C-4FCC-883E-593781E5FCB0}" v="11" dt="2024-06-21T06:15:56.871"/>
-  </p1510:revLst>
-</p1510:revInfo>
-</file>
-
-<file path=ppt/changesInfos/changesInfo1.xml><?xml version="1.0" encoding="utf-8"?>
-<pc:chgInfo xmlns:a="http://schemas.openxmlformats.org/drawingml/2006/main" xmlns:r="http://schemas.openxmlformats.org/officeDocument/2006/relationships" xmlns:ac="http://schemas.microsoft.com/office/drawing/2013/main/command" xmlns:pc="http://schemas.microsoft.com/office/powerpoint/2013/main/command">
-  <pc:docChgLst>
-    <pc:chgData name="Sharmaine Kirkham" userId="77a42548e3ef5a1f" providerId="LiveId" clId="{194CD0C4-092C-4FCC-883E-593781E5FCB0}"/>
-    <pc:docChg chg="undo custSel addSld modSld">
-      <pc:chgData name="Sharmaine Kirkham" userId="77a42548e3ef5a1f" providerId="LiveId" clId="{194CD0C4-092C-4FCC-883E-593781E5FCB0}" dt="2024-06-21T06:16:30.841" v="243" actId="207"/>
-      <pc:docMkLst>
-        <pc:docMk/>
-      </pc:docMkLst>
-      <pc:sldChg chg="addSp delSp modSp new mod">
-        <pc:chgData name="Sharmaine Kirkham" userId="77a42548e3ef5a1f" providerId="LiveId" clId="{194CD0C4-092C-4FCC-883E-593781E5FCB0}" dt="2024-06-21T06:16:30.841" v="243" actId="207"/>
-        <pc:sldMkLst>
-          <pc:docMk/>
-          <pc:sldMk cId="997275920" sldId="257"/>
-        </pc:sldMkLst>
-        <pc:spChg chg="add mod">
-          <ac:chgData name="Sharmaine Kirkham" userId="77a42548e3ef5a1f" providerId="LiveId" clId="{194CD0C4-092C-4FCC-883E-593781E5FCB0}" dt="2024-06-21T06:01:21.373" v="208"/>
-          <ac:spMkLst>
-            <pc:docMk/>
-            <pc:sldMk cId="997275920" sldId="257"/>
-            <ac:spMk id="9" creationId="{C04B72FF-7C27-4960-6C49-A1D5718AD5B5}"/>
-          </ac:spMkLst>
-        </pc:spChg>
-        <pc:spChg chg="add mod">
-          <ac:chgData name="Sharmaine Kirkham" userId="77a42548e3ef5a1f" providerId="LiveId" clId="{194CD0C4-092C-4FCC-883E-593781E5FCB0}" dt="2024-06-21T06:16:30.841" v="243" actId="207"/>
-          <ac:spMkLst>
-            <pc:docMk/>
-            <pc:sldMk cId="997275920" sldId="257"/>
-            <ac:spMk id="10" creationId="{236F9E0E-C9D3-2A03-7FE8-7B6107A38C9D}"/>
-          </ac:spMkLst>
-        </pc:spChg>
-        <pc:grpChg chg="add mod">
-          <ac:chgData name="Sharmaine Kirkham" userId="77a42548e3ef5a1f" providerId="LiveId" clId="{194CD0C4-092C-4FCC-883E-593781E5FCB0}" dt="2024-06-21T05:59:36.214" v="151" actId="14100"/>
-          <ac:grpSpMkLst>
-            <pc:docMk/>
-            <pc:sldMk cId="997275920" sldId="257"/>
-            <ac:grpSpMk id="6" creationId="{2582EA95-D663-7AC8-584D-9D64D80C5D1E}"/>
-          </ac:grpSpMkLst>
-        </pc:grpChg>
-        <pc:picChg chg="add del">
-          <ac:chgData name="Sharmaine Kirkham" userId="77a42548e3ef5a1f" providerId="LiveId" clId="{194CD0C4-092C-4FCC-883E-593781E5FCB0}" dt="2024-06-21T05:57:04.840" v="138" actId="478"/>
-          <ac:picMkLst>
-            <pc:docMk/>
-            <pc:sldMk cId="997275920" sldId="257"/>
-            <ac:picMk id="3" creationId="{7D095E6B-EE03-18DE-42F2-6769C314FA0D}"/>
-          </ac:picMkLst>
-        </pc:picChg>
-        <pc:picChg chg="add mod">
-          <ac:chgData name="Sharmaine Kirkham" userId="77a42548e3ef5a1f" providerId="LiveId" clId="{194CD0C4-092C-4FCC-883E-593781E5FCB0}" dt="2024-06-21T05:59:20.347" v="150" actId="164"/>
-          <ac:picMkLst>
-            <pc:docMk/>
-            <pc:sldMk cId="997275920" sldId="257"/>
-            <ac:picMk id="5" creationId="{93C1270F-60F2-D8D5-91BB-7885A6DE3F41}"/>
-          </ac:picMkLst>
-        </pc:picChg>
-        <pc:picChg chg="add mod">
-          <ac:chgData name="Sharmaine Kirkham" userId="77a42548e3ef5a1f" providerId="LiveId" clId="{194CD0C4-092C-4FCC-883E-593781E5FCB0}" dt="2024-06-21T05:56:34.239" v="132"/>
-          <ac:picMkLst>
-            <pc:docMk/>
-            <pc:sldMk cId="997275920" sldId="257"/>
-            <ac:picMk id="7" creationId="{FA0F60EF-D812-0213-9E1C-67024F2391CF}"/>
-          </ac:picMkLst>
-        </pc:picChg>
-        <pc:picChg chg="add mod modCrop">
-          <ac:chgData name="Sharmaine Kirkham" userId="77a42548e3ef5a1f" providerId="LiveId" clId="{194CD0C4-092C-4FCC-883E-593781E5FCB0}" dt="2024-06-21T05:59:20.347" v="150" actId="164"/>
-          <ac:picMkLst>
-            <pc:docMk/>
-            <pc:sldMk cId="997275920" sldId="257"/>
-            <ac:picMk id="8" creationId="{1052F1E1-161E-A6F1-996A-1672DF1452BC}"/>
-          </ac:picMkLst>
-        </pc:picChg>
-      </pc:sldChg>
-      <pc:sldChg chg="addSp delSp modSp new mod">
-        <pc:chgData name="Sharmaine Kirkham" userId="77a42548e3ef5a1f" providerId="LiveId" clId="{194CD0C4-092C-4FCC-883E-593781E5FCB0}" dt="2024-06-21T05:58:23.881" v="143" actId="21"/>
-        <pc:sldMkLst>
-          <pc:docMk/>
-          <pc:sldMk cId="2807728461" sldId="258"/>
-        </pc:sldMkLst>
-        <pc:picChg chg="add del">
-          <ac:chgData name="Sharmaine Kirkham" userId="77a42548e3ef5a1f" providerId="LiveId" clId="{194CD0C4-092C-4FCC-883E-593781E5FCB0}" dt="2024-06-21T05:55:11.644" v="4" actId="478"/>
-          <ac:picMkLst>
-            <pc:docMk/>
-            <pc:sldMk cId="2807728461" sldId="258"/>
-            <ac:picMk id="3" creationId="{BABDBB60-61AE-2A46-8AE7-243B1F0A8383}"/>
-          </ac:picMkLst>
-        </pc:picChg>
-        <pc:picChg chg="add del">
-          <ac:chgData name="Sharmaine Kirkham" userId="77a42548e3ef5a1f" providerId="LiveId" clId="{194CD0C4-092C-4FCC-883E-593781E5FCB0}" dt="2024-06-21T05:56:06.541" v="6" actId="478"/>
-          <ac:picMkLst>
-            <pc:docMk/>
-            <pc:sldMk cId="2807728461" sldId="258"/>
-            <ac:picMk id="5" creationId="{62D024FC-40BC-8092-5AAC-3C88668E8BE4}"/>
-          </ac:picMkLst>
-        </pc:picChg>
-        <pc:picChg chg="add del mod">
-          <ac:chgData name="Sharmaine Kirkham" userId="77a42548e3ef5a1f" providerId="LiveId" clId="{194CD0C4-092C-4FCC-883E-593781E5FCB0}" dt="2024-06-21T05:56:32.874" v="131" actId="21"/>
-          <ac:picMkLst>
-            <pc:docMk/>
-            <pc:sldMk cId="2807728461" sldId="258"/>
-            <ac:picMk id="7" creationId="{FA0F60EF-D812-0213-9E1C-67024F2391CF}"/>
-          </ac:picMkLst>
-        </pc:picChg>
-        <pc:picChg chg="add del mod">
-          <ac:chgData name="Sharmaine Kirkham" userId="77a42548e3ef5a1f" providerId="LiveId" clId="{194CD0C4-092C-4FCC-883E-593781E5FCB0}" dt="2024-06-21T05:58:23.881" v="143" actId="21"/>
-          <ac:picMkLst>
-            <pc:docMk/>
-            <pc:sldMk cId="2807728461" sldId="258"/>
-            <ac:picMk id="8" creationId="{1052F1E1-161E-A6F1-996A-1672DF1452BC}"/>
-          </ac:picMkLst>
-        </pc:picChg>
-        <pc:picChg chg="add del">
-          <ac:chgData name="Sharmaine Kirkham" userId="77a42548e3ef5a1f" providerId="LiveId" clId="{194CD0C4-092C-4FCC-883E-593781E5FCB0}" dt="2024-06-21T05:57:01.306" v="136" actId="22"/>
-          <ac:picMkLst>
-            <pc:docMk/>
-            <pc:sldMk cId="2807728461" sldId="258"/>
-            <ac:picMk id="10" creationId="{B72569EE-C359-66A3-083C-4C28189004CB}"/>
-          </ac:picMkLst>
-        </pc:picChg>
-      </pc:sldChg>
-    </pc:docChg>
-  </pc:docChgLst>
-</pc:chgInfo>
 </file>
 
 <file path=ppt/slideLayouts/slideLayout1.xml><?xml version="1.0" encoding="utf-8"?>
@@ -4101,67 +3969,67 @@
         <p:spPr>
           <a:xfrm>
             <a:off x="4511197" y="501041"/>
-            <a:ext cx="6090900" cy="2430050"/>
+            <a:ext cx="6090900" cy="2106235"/>
           </a:xfrm>
           <a:custGeom>
             <a:avLst/>
             <a:gdLst>
               <a:gd name="connsiteX0" fmla="*/ 0 w 6090900"/>
-              <a:gd name="connsiteY0" fmla="*/ 0 h 2430050"/>
+              <a:gd name="connsiteY0" fmla="*/ 0 h 2106235"/>
               <a:gd name="connsiteX1" fmla="*/ 494040 w 6090900"/>
-              <a:gd name="connsiteY1" fmla="*/ 0 h 2430050"/>
+              <a:gd name="connsiteY1" fmla="*/ 0 h 2106235"/>
               <a:gd name="connsiteX2" fmla="*/ 988079 w 6090900"/>
-              <a:gd name="connsiteY2" fmla="*/ 0 h 2430050"/>
+              <a:gd name="connsiteY2" fmla="*/ 0 h 2106235"/>
               <a:gd name="connsiteX3" fmla="*/ 1482119 w 6090900"/>
-              <a:gd name="connsiteY3" fmla="*/ 0 h 2430050"/>
+              <a:gd name="connsiteY3" fmla="*/ 0 h 2106235"/>
               <a:gd name="connsiteX4" fmla="*/ 2158886 w 6090900"/>
-              <a:gd name="connsiteY4" fmla="*/ 0 h 2430050"/>
+              <a:gd name="connsiteY4" fmla="*/ 0 h 2106235"/>
               <a:gd name="connsiteX5" fmla="*/ 2957470 w 6090900"/>
-              <a:gd name="connsiteY5" fmla="*/ 0 h 2430050"/>
+              <a:gd name="connsiteY5" fmla="*/ 0 h 2106235"/>
               <a:gd name="connsiteX6" fmla="*/ 3451510 w 6090900"/>
-              <a:gd name="connsiteY6" fmla="*/ 0 h 2430050"/>
+              <a:gd name="connsiteY6" fmla="*/ 0 h 2106235"/>
               <a:gd name="connsiteX7" fmla="*/ 3945550 w 6090900"/>
-              <a:gd name="connsiteY7" fmla="*/ 0 h 2430050"/>
+              <a:gd name="connsiteY7" fmla="*/ 0 h 2106235"/>
               <a:gd name="connsiteX8" fmla="*/ 4561407 w 6090900"/>
-              <a:gd name="connsiteY8" fmla="*/ 0 h 2430050"/>
+              <a:gd name="connsiteY8" fmla="*/ 0 h 2106235"/>
               <a:gd name="connsiteX9" fmla="*/ 5238174 w 6090900"/>
-              <a:gd name="connsiteY9" fmla="*/ 0 h 2430050"/>
+              <a:gd name="connsiteY9" fmla="*/ 0 h 2106235"/>
               <a:gd name="connsiteX10" fmla="*/ 6090900 w 6090900"/>
-              <a:gd name="connsiteY10" fmla="*/ 0 h 2430050"/>
+              <a:gd name="connsiteY10" fmla="*/ 0 h 2106235"/>
               <a:gd name="connsiteX11" fmla="*/ 6090900 w 6090900"/>
-              <a:gd name="connsiteY11" fmla="*/ 558912 h 2430050"/>
+              <a:gd name="connsiteY11" fmla="*/ 484434 h 2106235"/>
               <a:gd name="connsiteX12" fmla="*/ 6090900 w 6090900"/>
-              <a:gd name="connsiteY12" fmla="*/ 1190725 h 2430050"/>
+              <a:gd name="connsiteY12" fmla="*/ 1032055 h 2106235"/>
               <a:gd name="connsiteX13" fmla="*/ 6090900 w 6090900"/>
-              <a:gd name="connsiteY13" fmla="*/ 1749636 h 2430050"/>
+              <a:gd name="connsiteY13" fmla="*/ 1516489 h 2106235"/>
               <a:gd name="connsiteX14" fmla="*/ 6090900 w 6090900"/>
-              <a:gd name="connsiteY14" fmla="*/ 2430050 h 2430050"/>
+              <a:gd name="connsiteY14" fmla="*/ 2106235 h 2106235"/>
               <a:gd name="connsiteX15" fmla="*/ 5475042 w 6090900"/>
-              <a:gd name="connsiteY15" fmla="*/ 2430050 h 2430050"/>
+              <a:gd name="connsiteY15" fmla="*/ 2106235 h 2106235"/>
               <a:gd name="connsiteX16" fmla="*/ 4920094 w 6090900"/>
-              <a:gd name="connsiteY16" fmla="*/ 2430050 h 2430050"/>
+              <a:gd name="connsiteY16" fmla="*/ 2106235 h 2106235"/>
               <a:gd name="connsiteX17" fmla="*/ 4304236 w 6090900"/>
-              <a:gd name="connsiteY17" fmla="*/ 2430050 h 2430050"/>
+              <a:gd name="connsiteY17" fmla="*/ 2106235 h 2106235"/>
               <a:gd name="connsiteX18" fmla="*/ 3566560 w 6090900"/>
-              <a:gd name="connsiteY18" fmla="*/ 2430050 h 2430050"/>
+              <a:gd name="connsiteY18" fmla="*/ 2106235 h 2106235"/>
               <a:gd name="connsiteX19" fmla="*/ 2950703 w 6090900"/>
-              <a:gd name="connsiteY19" fmla="*/ 2430050 h 2430050"/>
+              <a:gd name="connsiteY19" fmla="*/ 2106235 h 2106235"/>
               <a:gd name="connsiteX20" fmla="*/ 2395754 w 6090900"/>
-              <a:gd name="connsiteY20" fmla="*/ 2430050 h 2430050"/>
+              <a:gd name="connsiteY20" fmla="*/ 2106235 h 2106235"/>
               <a:gd name="connsiteX21" fmla="*/ 1597169 w 6090900"/>
-              <a:gd name="connsiteY21" fmla="*/ 2430050 h 2430050"/>
+              <a:gd name="connsiteY21" fmla="*/ 2106235 h 2106235"/>
               <a:gd name="connsiteX22" fmla="*/ 920403 w 6090900"/>
-              <a:gd name="connsiteY22" fmla="*/ 2430050 h 2430050"/>
+              <a:gd name="connsiteY22" fmla="*/ 2106235 h 2106235"/>
               <a:gd name="connsiteX23" fmla="*/ 0 w 6090900"/>
-              <a:gd name="connsiteY23" fmla="*/ 2430050 h 2430050"/>
+              <a:gd name="connsiteY23" fmla="*/ 2106235 h 2106235"/>
               <a:gd name="connsiteX24" fmla="*/ 0 w 6090900"/>
-              <a:gd name="connsiteY24" fmla="*/ 1895439 h 2430050"/>
+              <a:gd name="connsiteY24" fmla="*/ 1642863 h 2106235"/>
               <a:gd name="connsiteX25" fmla="*/ 0 w 6090900"/>
-              <a:gd name="connsiteY25" fmla="*/ 1263626 h 2430050"/>
+              <a:gd name="connsiteY25" fmla="*/ 1095242 h 2106235"/>
               <a:gd name="connsiteX26" fmla="*/ 0 w 6090900"/>
-              <a:gd name="connsiteY26" fmla="*/ 656114 h 2430050"/>
+              <a:gd name="connsiteY26" fmla="*/ 568683 h 2106235"/>
               <a:gd name="connsiteX27" fmla="*/ 0 w 6090900"/>
-              <a:gd name="connsiteY27" fmla="*/ 0 h 2430050"/>
+              <a:gd name="connsiteY27" fmla="*/ 0 h 2106235"/>
             </a:gdLst>
             <a:ahLst/>
             <a:cxnLst>
@@ -4252,7 +4120,7 @@
             </a:cxnLst>
             <a:rect l="l" t="t" r="r" b="b"/>
             <a:pathLst>
-              <a:path w="6090900" h="2430050" extrusionOk="0">
+              <a:path w="6090900" h="2106235" extrusionOk="0">
                 <a:moveTo>
                   <a:pt x="0" y="0"/>
                 </a:moveTo>
@@ -4307,88 +4175,88 @@
                   <a:pt x="6090900" y="0"/>
                 </a:cubicBezTo>
                 <a:cubicBezTo>
-                  <a:pt x="6117347" y="188551"/>
-                  <a:pt x="6099759" y="330137"/>
-                  <a:pt x="6090900" y="558912"/>
-                </a:cubicBezTo>
-                <a:cubicBezTo>
-                  <a:pt x="6082041" y="787687"/>
-                  <a:pt x="6109517" y="1007850"/>
-                  <a:pt x="6090900" y="1190725"/>
-                </a:cubicBezTo>
-                <a:cubicBezTo>
-                  <a:pt x="6072283" y="1373600"/>
-                  <a:pt x="6077866" y="1544939"/>
-                  <a:pt x="6090900" y="1749636"/>
-                </a:cubicBezTo>
-                <a:cubicBezTo>
-                  <a:pt x="6103934" y="1954333"/>
-                  <a:pt x="6058271" y="2291018"/>
-                  <a:pt x="6090900" y="2430050"/>
-                </a:cubicBezTo>
-                <a:cubicBezTo>
-                  <a:pt x="5867305" y="2431692"/>
-                  <a:pt x="5599775" y="2408928"/>
-                  <a:pt x="5475042" y="2430050"/>
-                </a:cubicBezTo>
-                <a:cubicBezTo>
-                  <a:pt x="5350309" y="2451172"/>
-                  <a:pt x="5074724" y="2423335"/>
-                  <a:pt x="4920094" y="2430050"/>
-                </a:cubicBezTo>
-                <a:cubicBezTo>
-                  <a:pt x="4765464" y="2436765"/>
-                  <a:pt x="4495741" y="2454803"/>
-                  <a:pt x="4304236" y="2430050"/>
-                </a:cubicBezTo>
-                <a:cubicBezTo>
-                  <a:pt x="4112731" y="2405297"/>
-                  <a:pt x="3888701" y="2425542"/>
-                  <a:pt x="3566560" y="2430050"/>
-                </a:cubicBezTo>
-                <a:cubicBezTo>
-                  <a:pt x="3244419" y="2434558"/>
-                  <a:pt x="3117361" y="2413758"/>
-                  <a:pt x="2950703" y="2430050"/>
-                </a:cubicBezTo>
-                <a:cubicBezTo>
-                  <a:pt x="2784045" y="2446342"/>
-                  <a:pt x="2669853" y="2433915"/>
-                  <a:pt x="2395754" y="2430050"/>
-                </a:cubicBezTo>
-                <a:cubicBezTo>
-                  <a:pt x="2121655" y="2426185"/>
-                  <a:pt x="1847012" y="2449861"/>
-                  <a:pt x="1597169" y="2430050"/>
-                </a:cubicBezTo>
-                <a:cubicBezTo>
-                  <a:pt x="1347327" y="2410239"/>
-                  <a:pt x="1170725" y="2446317"/>
-                  <a:pt x="920403" y="2430050"/>
-                </a:cubicBezTo>
-                <a:cubicBezTo>
-                  <a:pt x="670081" y="2413783"/>
-                  <a:pt x="409519" y="2388607"/>
-                  <a:pt x="0" y="2430050"/>
-                </a:cubicBezTo>
-                <a:cubicBezTo>
-                  <a:pt x="2553" y="2180757"/>
-                  <a:pt x="-20447" y="2046902"/>
-                  <a:pt x="0" y="1895439"/>
-                </a:cubicBezTo>
-                <a:cubicBezTo>
-                  <a:pt x="20447" y="1743976"/>
-                  <a:pt x="-6206" y="1551827"/>
-                  <a:pt x="0" y="1263626"/>
-                </a:cubicBezTo>
-                <a:cubicBezTo>
-                  <a:pt x="6206" y="975425"/>
-                  <a:pt x="30163" y="844092"/>
-                  <a:pt x="0" y="656114"/>
-                </a:cubicBezTo>
-                <a:cubicBezTo>
-                  <a:pt x="-30163" y="468136"/>
-                  <a:pt x="434" y="325244"/>
+                  <a:pt x="6102607" y="126494"/>
+                  <a:pt x="6107500" y="376664"/>
+                  <a:pt x="6090900" y="484434"/>
+                </a:cubicBezTo>
+                <a:cubicBezTo>
+                  <a:pt x="6074300" y="592204"/>
+                  <a:pt x="6095731" y="833601"/>
+                  <a:pt x="6090900" y="1032055"/>
+                </a:cubicBezTo>
+                <a:cubicBezTo>
+                  <a:pt x="6086069" y="1230509"/>
+                  <a:pt x="6082035" y="1284851"/>
+                  <a:pt x="6090900" y="1516489"/>
+                </a:cubicBezTo>
+                <a:cubicBezTo>
+                  <a:pt x="6099765" y="1748127"/>
+                  <a:pt x="6077541" y="1872625"/>
+                  <a:pt x="6090900" y="2106235"/>
+                </a:cubicBezTo>
+                <a:cubicBezTo>
+                  <a:pt x="5867305" y="2107877"/>
+                  <a:pt x="5599775" y="2085113"/>
+                  <a:pt x="5475042" y="2106235"/>
+                </a:cubicBezTo>
+                <a:cubicBezTo>
+                  <a:pt x="5350309" y="2127357"/>
+                  <a:pt x="5074724" y="2099520"/>
+                  <a:pt x="4920094" y="2106235"/>
+                </a:cubicBezTo>
+                <a:cubicBezTo>
+                  <a:pt x="4765464" y="2112950"/>
+                  <a:pt x="4495741" y="2130988"/>
+                  <a:pt x="4304236" y="2106235"/>
+                </a:cubicBezTo>
+                <a:cubicBezTo>
+                  <a:pt x="4112731" y="2081482"/>
+                  <a:pt x="3888701" y="2101727"/>
+                  <a:pt x="3566560" y="2106235"/>
+                </a:cubicBezTo>
+                <a:cubicBezTo>
+                  <a:pt x="3244419" y="2110743"/>
+                  <a:pt x="3117361" y="2089943"/>
+                  <a:pt x="2950703" y="2106235"/>
+                </a:cubicBezTo>
+                <a:cubicBezTo>
+                  <a:pt x="2784045" y="2122527"/>
+                  <a:pt x="2669853" y="2110100"/>
+                  <a:pt x="2395754" y="2106235"/>
+                </a:cubicBezTo>
+                <a:cubicBezTo>
+                  <a:pt x="2121655" y="2102370"/>
+                  <a:pt x="1847012" y="2126046"/>
+                  <a:pt x="1597169" y="2106235"/>
+                </a:cubicBezTo>
+                <a:cubicBezTo>
+                  <a:pt x="1347327" y="2086424"/>
+                  <a:pt x="1170725" y="2122502"/>
+                  <a:pt x="920403" y="2106235"/>
+                </a:cubicBezTo>
+                <a:cubicBezTo>
+                  <a:pt x="670081" y="2089968"/>
+                  <a:pt x="409519" y="2064792"/>
+                  <a:pt x="0" y="2106235"/>
+                </a:cubicBezTo>
+                <a:cubicBezTo>
+                  <a:pt x="22022" y="1932334"/>
+                  <a:pt x="4887" y="1767316"/>
+                  <a:pt x="0" y="1642863"/>
+                </a:cubicBezTo>
+                <a:cubicBezTo>
+                  <a:pt x="-4887" y="1518410"/>
+                  <a:pt x="7880" y="1277861"/>
+                  <a:pt x="0" y="1095242"/>
+                </a:cubicBezTo>
+                <a:cubicBezTo>
+                  <a:pt x="-7880" y="912623"/>
+                  <a:pt x="14440" y="807263"/>
+                  <a:pt x="0" y="568683"/>
+                </a:cubicBezTo>
+                <a:cubicBezTo>
+                  <a:pt x="-14440" y="330103"/>
+                  <a:pt x="-3272" y="183106"/>
                   <a:pt x="0" y="0"/>
                 </a:cubicBezTo>
                 <a:close/>
@@ -4454,74 +4322,74 @@
         </p:nvSpPr>
         <p:spPr>
           <a:xfrm>
-            <a:off x="4511196" y="2956141"/>
-            <a:ext cx="6090901" cy="3626285"/>
+            <a:off x="4511196" y="2631989"/>
+            <a:ext cx="6090901" cy="3950438"/>
           </a:xfrm>
           <a:custGeom>
             <a:avLst/>
             <a:gdLst>
               <a:gd name="connsiteX0" fmla="*/ 0 w 6090901"/>
-              <a:gd name="connsiteY0" fmla="*/ 0 h 3626285"/>
+              <a:gd name="connsiteY0" fmla="*/ 0 h 3950438"/>
               <a:gd name="connsiteX1" fmla="*/ 798585 w 6090901"/>
-              <a:gd name="connsiteY1" fmla="*/ 0 h 3626285"/>
+              <a:gd name="connsiteY1" fmla="*/ 0 h 3950438"/>
               <a:gd name="connsiteX2" fmla="*/ 1475352 w 6090901"/>
-              <a:gd name="connsiteY2" fmla="*/ 0 h 3626285"/>
+              <a:gd name="connsiteY2" fmla="*/ 0 h 3950438"/>
               <a:gd name="connsiteX3" fmla="*/ 2152118 w 6090901"/>
-              <a:gd name="connsiteY3" fmla="*/ 0 h 3626285"/>
+              <a:gd name="connsiteY3" fmla="*/ 0 h 3950438"/>
               <a:gd name="connsiteX4" fmla="*/ 2889794 w 6090901"/>
-              <a:gd name="connsiteY4" fmla="*/ 0 h 3626285"/>
+              <a:gd name="connsiteY4" fmla="*/ 0 h 3950438"/>
               <a:gd name="connsiteX5" fmla="*/ 3688379 w 6090901"/>
-              <a:gd name="connsiteY5" fmla="*/ 0 h 3626285"/>
+              <a:gd name="connsiteY5" fmla="*/ 0 h 3950438"/>
               <a:gd name="connsiteX6" fmla="*/ 4182419 w 6090901"/>
-              <a:gd name="connsiteY6" fmla="*/ 0 h 3626285"/>
+              <a:gd name="connsiteY6" fmla="*/ 0 h 3950438"/>
               <a:gd name="connsiteX7" fmla="*/ 4859185 w 6090901"/>
-              <a:gd name="connsiteY7" fmla="*/ 0 h 3626285"/>
+              <a:gd name="connsiteY7" fmla="*/ 0 h 3950438"/>
               <a:gd name="connsiteX8" fmla="*/ 5475043 w 6090901"/>
-              <a:gd name="connsiteY8" fmla="*/ 0 h 3626285"/>
+              <a:gd name="connsiteY8" fmla="*/ 0 h 3950438"/>
               <a:gd name="connsiteX9" fmla="*/ 6090901 w 6090901"/>
-              <a:gd name="connsiteY9" fmla="*/ 0 h 3626285"/>
+              <a:gd name="connsiteY9" fmla="*/ 0 h 3950438"/>
               <a:gd name="connsiteX10" fmla="*/ 6090901 w 6090901"/>
-              <a:gd name="connsiteY10" fmla="*/ 604381 h 3626285"/>
+              <a:gd name="connsiteY10" fmla="*/ 658406 h 3950438"/>
               <a:gd name="connsiteX11" fmla="*/ 6090901 w 6090901"/>
-              <a:gd name="connsiteY11" fmla="*/ 1281287 h 3626285"/>
+              <a:gd name="connsiteY11" fmla="*/ 1395821 h 3950438"/>
               <a:gd name="connsiteX12" fmla="*/ 6090901 w 6090901"/>
-              <a:gd name="connsiteY12" fmla="*/ 1849405 h 3626285"/>
+              <a:gd name="connsiteY12" fmla="*/ 2014723 h 3950438"/>
               <a:gd name="connsiteX13" fmla="*/ 6090901 w 6090901"/>
-              <a:gd name="connsiteY13" fmla="*/ 2453786 h 3626285"/>
+              <a:gd name="connsiteY13" fmla="*/ 2673130 h 3950438"/>
               <a:gd name="connsiteX14" fmla="*/ 6090901 w 6090901"/>
-              <a:gd name="connsiteY14" fmla="*/ 2949378 h 3626285"/>
+              <a:gd name="connsiteY14" fmla="*/ 3213023 h 3950438"/>
               <a:gd name="connsiteX15" fmla="*/ 6090901 w 6090901"/>
-              <a:gd name="connsiteY15" fmla="*/ 3626285 h 3626285"/>
+              <a:gd name="connsiteY15" fmla="*/ 3950438 h 3950438"/>
               <a:gd name="connsiteX16" fmla="*/ 5596861 w 6090901"/>
-              <a:gd name="connsiteY16" fmla="*/ 3626285 h 3626285"/>
+              <a:gd name="connsiteY16" fmla="*/ 3950438 h 3950438"/>
               <a:gd name="connsiteX17" fmla="*/ 5102822 w 6090901"/>
-              <a:gd name="connsiteY17" fmla="*/ 3626285 h 3626285"/>
+              <a:gd name="connsiteY17" fmla="*/ 3950438 h 3950438"/>
               <a:gd name="connsiteX18" fmla="*/ 4304237 w 6090901"/>
-              <a:gd name="connsiteY18" fmla="*/ 3626285 h 3626285"/>
+              <a:gd name="connsiteY18" fmla="*/ 3950438 h 3950438"/>
               <a:gd name="connsiteX19" fmla="*/ 3505652 w 6090901"/>
-              <a:gd name="connsiteY19" fmla="*/ 3626285 h 3626285"/>
+              <a:gd name="connsiteY19" fmla="*/ 3950438 h 3950438"/>
               <a:gd name="connsiteX20" fmla="*/ 2889794 w 6090901"/>
-              <a:gd name="connsiteY20" fmla="*/ 3626285 h 3626285"/>
+              <a:gd name="connsiteY20" fmla="*/ 3950438 h 3950438"/>
               <a:gd name="connsiteX21" fmla="*/ 2152118 w 6090901"/>
-              <a:gd name="connsiteY21" fmla="*/ 3626285 h 3626285"/>
+              <a:gd name="connsiteY21" fmla="*/ 3950438 h 3950438"/>
               <a:gd name="connsiteX22" fmla="*/ 1475352 w 6090901"/>
-              <a:gd name="connsiteY22" fmla="*/ 3626285 h 3626285"/>
+              <a:gd name="connsiteY22" fmla="*/ 3950438 h 3950438"/>
               <a:gd name="connsiteX23" fmla="*/ 676767 w 6090901"/>
-              <a:gd name="connsiteY23" fmla="*/ 3626285 h 3626285"/>
+              <a:gd name="connsiteY23" fmla="*/ 3950438 h 3950438"/>
               <a:gd name="connsiteX24" fmla="*/ 0 w 6090901"/>
-              <a:gd name="connsiteY24" fmla="*/ 3626285 h 3626285"/>
+              <a:gd name="connsiteY24" fmla="*/ 3950438 h 3950438"/>
               <a:gd name="connsiteX25" fmla="*/ 0 w 6090901"/>
-              <a:gd name="connsiteY25" fmla="*/ 3094430 h 3626285"/>
+              <a:gd name="connsiteY25" fmla="*/ 3371040 h 3950438"/>
               <a:gd name="connsiteX26" fmla="*/ 0 w 6090901"/>
-              <a:gd name="connsiteY26" fmla="*/ 2490049 h 3626285"/>
+              <a:gd name="connsiteY26" fmla="*/ 2712634 h 3950438"/>
               <a:gd name="connsiteX27" fmla="*/ 0 w 6090901"/>
-              <a:gd name="connsiteY27" fmla="*/ 1813143 h 3626285"/>
+              <a:gd name="connsiteY27" fmla="*/ 1975219 h 3950438"/>
               <a:gd name="connsiteX28" fmla="*/ 0 w 6090901"/>
-              <a:gd name="connsiteY28" fmla="*/ 1208762 h 3626285"/>
+              <a:gd name="connsiteY28" fmla="*/ 1316813 h 3950438"/>
               <a:gd name="connsiteX29" fmla="*/ 0 w 6090901"/>
-              <a:gd name="connsiteY29" fmla="*/ 568118 h 3626285"/>
+              <a:gd name="connsiteY29" fmla="*/ 618902 h 3950438"/>
               <a:gd name="connsiteX30" fmla="*/ 0 w 6090901"/>
-              <a:gd name="connsiteY30" fmla="*/ 0 h 3626285"/>
+              <a:gd name="connsiteY30" fmla="*/ 0 h 3950438"/>
             </a:gdLst>
             <a:ahLst/>
             <a:cxnLst>
@@ -4621,7 +4489,7 @@
             </a:cxnLst>
             <a:rect l="l" t="t" r="r" b="b"/>
             <a:pathLst>
-              <a:path w="6090901" h="3626285" extrusionOk="0">
+              <a:path w="6090901" h="3950438" extrusionOk="0">
                 <a:moveTo>
                   <a:pt x="0" y="0"/>
                 </a:moveTo>
@@ -4671,108 +4539,108 @@
                   <a:pt x="6090901" y="0"/>
                 </a:cubicBezTo>
                 <a:cubicBezTo>
-                  <a:pt x="6085182" y="208399"/>
-                  <a:pt x="6080657" y="378361"/>
-                  <a:pt x="6090901" y="604381"/>
-                </a:cubicBezTo>
-                <a:cubicBezTo>
-                  <a:pt x="6101145" y="830401"/>
-                  <a:pt x="6057887" y="972720"/>
-                  <a:pt x="6090901" y="1281287"/>
-                </a:cubicBezTo>
-                <a:cubicBezTo>
-                  <a:pt x="6123915" y="1589854"/>
-                  <a:pt x="6083516" y="1569710"/>
-                  <a:pt x="6090901" y="1849405"/>
-                </a:cubicBezTo>
-                <a:cubicBezTo>
-                  <a:pt x="6098286" y="2129100"/>
-                  <a:pt x="6107006" y="2242196"/>
-                  <a:pt x="6090901" y="2453786"/>
-                </a:cubicBezTo>
-                <a:cubicBezTo>
-                  <a:pt x="6074796" y="2665376"/>
-                  <a:pt x="6107732" y="2778681"/>
-                  <a:pt x="6090901" y="2949378"/>
-                </a:cubicBezTo>
-                <a:cubicBezTo>
-                  <a:pt x="6074070" y="3120075"/>
-                  <a:pt x="6123315" y="3310516"/>
-                  <a:pt x="6090901" y="3626285"/>
-                </a:cubicBezTo>
-                <a:cubicBezTo>
-                  <a:pt x="5926213" y="3638640"/>
-                  <a:pt x="5708605" y="3639836"/>
-                  <a:pt x="5596861" y="3626285"/>
-                </a:cubicBezTo>
-                <a:cubicBezTo>
-                  <a:pt x="5485117" y="3612734"/>
-                  <a:pt x="5290870" y="3621320"/>
-                  <a:pt x="5102822" y="3626285"/>
-                </a:cubicBezTo>
-                <a:cubicBezTo>
-                  <a:pt x="4914774" y="3631250"/>
-                  <a:pt x="4508869" y="3640000"/>
-                  <a:pt x="4304237" y="3626285"/>
-                </a:cubicBezTo>
-                <a:cubicBezTo>
-                  <a:pt x="4099605" y="3612570"/>
-                  <a:pt x="3742188" y="3663703"/>
-                  <a:pt x="3505652" y="3626285"/>
-                </a:cubicBezTo>
-                <a:cubicBezTo>
-                  <a:pt x="3269116" y="3588867"/>
-                  <a:pt x="3174981" y="3614031"/>
-                  <a:pt x="2889794" y="3626285"/>
-                </a:cubicBezTo>
-                <a:cubicBezTo>
-                  <a:pt x="2604607" y="3638539"/>
-                  <a:pt x="2483276" y="3599674"/>
-                  <a:pt x="2152118" y="3626285"/>
-                </a:cubicBezTo>
-                <a:cubicBezTo>
-                  <a:pt x="1820960" y="3652896"/>
-                  <a:pt x="1626602" y="3655726"/>
-                  <a:pt x="1475352" y="3626285"/>
-                </a:cubicBezTo>
-                <a:cubicBezTo>
-                  <a:pt x="1324102" y="3596844"/>
-                  <a:pt x="992475" y="3588002"/>
-                  <a:pt x="676767" y="3626285"/>
-                </a:cubicBezTo>
-                <a:cubicBezTo>
-                  <a:pt x="361060" y="3664568"/>
-                  <a:pt x="181168" y="3652977"/>
-                  <a:pt x="0" y="3626285"/>
-                </a:cubicBezTo>
-                <a:cubicBezTo>
-                  <a:pt x="14937" y="3421207"/>
-                  <a:pt x="2489" y="3314923"/>
-                  <a:pt x="0" y="3094430"/>
-                </a:cubicBezTo>
-                <a:cubicBezTo>
-                  <a:pt x="-2489" y="2873938"/>
-                  <a:pt x="-8705" y="2724448"/>
-                  <a:pt x="0" y="2490049"/>
-                </a:cubicBezTo>
-                <a:cubicBezTo>
-                  <a:pt x="8705" y="2255650"/>
-                  <a:pt x="24275" y="2026440"/>
-                  <a:pt x="0" y="1813143"/>
-                </a:cubicBezTo>
-                <a:cubicBezTo>
-                  <a:pt x="-24275" y="1599846"/>
-                  <a:pt x="6896" y="1368297"/>
-                  <a:pt x="0" y="1208762"/>
-                </a:cubicBezTo>
-                <a:cubicBezTo>
-                  <a:pt x="-6896" y="1049227"/>
-                  <a:pt x="7355" y="798047"/>
-                  <a:pt x="0" y="568118"/>
-                </a:cubicBezTo>
-                <a:cubicBezTo>
-                  <a:pt x="-7355" y="338189"/>
-                  <a:pt x="-16192" y="191959"/>
+                  <a:pt x="6117898" y="179728"/>
+                  <a:pt x="6111521" y="382843"/>
+                  <a:pt x="6090901" y="658406"/>
+                </a:cubicBezTo>
+                <a:cubicBezTo>
+                  <a:pt x="6070281" y="933969"/>
+                  <a:pt x="6122065" y="1062117"/>
+                  <a:pt x="6090901" y="1395821"/>
+                </a:cubicBezTo>
+                <a:cubicBezTo>
+                  <a:pt x="6059737" y="1729526"/>
+                  <a:pt x="6117972" y="1736241"/>
+                  <a:pt x="6090901" y="2014723"/>
+                </a:cubicBezTo>
+                <a:cubicBezTo>
+                  <a:pt x="6063830" y="2293205"/>
+                  <a:pt x="6078413" y="2433169"/>
+                  <a:pt x="6090901" y="2673130"/>
+                </a:cubicBezTo>
+                <a:cubicBezTo>
+                  <a:pt x="6103389" y="2913091"/>
+                  <a:pt x="6078183" y="2950086"/>
+                  <a:pt x="6090901" y="3213023"/>
+                </a:cubicBezTo>
+                <a:cubicBezTo>
+                  <a:pt x="6103619" y="3475960"/>
+                  <a:pt x="6086558" y="3656055"/>
+                  <a:pt x="6090901" y="3950438"/>
+                </a:cubicBezTo>
+                <a:cubicBezTo>
+                  <a:pt x="5926213" y="3962793"/>
+                  <a:pt x="5708605" y="3963989"/>
+                  <a:pt x="5596861" y="3950438"/>
+                </a:cubicBezTo>
+                <a:cubicBezTo>
+                  <a:pt x="5485117" y="3936887"/>
+                  <a:pt x="5290870" y="3945473"/>
+                  <a:pt x="5102822" y="3950438"/>
+                </a:cubicBezTo>
+                <a:cubicBezTo>
+                  <a:pt x="4914774" y="3955403"/>
+                  <a:pt x="4508869" y="3964153"/>
+                  <a:pt x="4304237" y="3950438"/>
+                </a:cubicBezTo>
+                <a:cubicBezTo>
+                  <a:pt x="4099605" y="3936723"/>
+                  <a:pt x="3742188" y="3987856"/>
+                  <a:pt x="3505652" y="3950438"/>
+                </a:cubicBezTo>
+                <a:cubicBezTo>
+                  <a:pt x="3269116" y="3913020"/>
+                  <a:pt x="3174981" y="3938184"/>
+                  <a:pt x="2889794" y="3950438"/>
+                </a:cubicBezTo>
+                <a:cubicBezTo>
+                  <a:pt x="2604607" y="3962692"/>
+                  <a:pt x="2483276" y="3923827"/>
+                  <a:pt x="2152118" y="3950438"/>
+                </a:cubicBezTo>
+                <a:cubicBezTo>
+                  <a:pt x="1820960" y="3977049"/>
+                  <a:pt x="1626602" y="3979879"/>
+                  <a:pt x="1475352" y="3950438"/>
+                </a:cubicBezTo>
+                <a:cubicBezTo>
+                  <a:pt x="1324102" y="3920997"/>
+                  <a:pt x="992475" y="3912155"/>
+                  <a:pt x="676767" y="3950438"/>
+                </a:cubicBezTo>
+                <a:cubicBezTo>
+                  <a:pt x="361060" y="3988721"/>
+                  <a:pt x="181168" y="3977130"/>
+                  <a:pt x="0" y="3950438"/>
+                </a:cubicBezTo>
+                <a:cubicBezTo>
+                  <a:pt x="-6076" y="3692833"/>
+                  <a:pt x="-7341" y="3498121"/>
+                  <a:pt x="0" y="3371040"/>
+                </a:cubicBezTo>
+                <a:cubicBezTo>
+                  <a:pt x="7341" y="3243959"/>
+                  <a:pt x="8106" y="2911650"/>
+                  <a:pt x="0" y="2712634"/>
+                </a:cubicBezTo>
+                <a:cubicBezTo>
+                  <a:pt x="-8106" y="2513618"/>
+                  <a:pt x="-22228" y="2306202"/>
+                  <a:pt x="0" y="1975219"/>
+                </a:cubicBezTo>
+                <a:cubicBezTo>
+                  <a:pt x="22228" y="1644236"/>
+                  <a:pt x="27092" y="1497588"/>
+                  <a:pt x="0" y="1316813"/>
+                </a:cubicBezTo>
+                <a:cubicBezTo>
+                  <a:pt x="-27092" y="1136038"/>
+                  <a:pt x="5838" y="900218"/>
+                  <a:pt x="0" y="618902"/>
+                </a:cubicBezTo>
+                <a:cubicBezTo>
+                  <a:pt x="-5838" y="337586"/>
+                  <a:pt x="-583" y="229302"/>
                   <a:pt x="0" y="0"/>
                 </a:cubicBezTo>
                 <a:close/>
@@ -4968,7 +4836,7 @@
         </p:nvSpPr>
         <p:spPr>
           <a:xfrm>
-            <a:off x="10878855" y="3200401"/>
+            <a:off x="10878855" y="2638167"/>
             <a:ext cx="1233814" cy="430887"/>
           </a:xfrm>
           <a:prstGeom prst="rect">

</xml_diff>